<commit_message>
alteração final dos slides da apresentação 3
</commit_message>
<xml_diff>
--- a/Documentacao/Análise de sistemas/Slides KPRunnin - Sprint 3.pptx
+++ b/Documentacao/Análise de sistemas/Slides KPRunnin - Sprint 3.pptx
@@ -29,39 +29,39 @@
   <p:notesSz cx="6858000" cy="9144000"/>
   <p:embeddedFontLst>
     <p:embeddedFont>
-      <p:font typeface="Josefin Sans" panose="020B0604020202020204" charset="0"/>
+      <p:font typeface="Roboto Light" panose="020B0604020202020204" charset="0"/>
       <p:regular r:id="rId19"/>
       <p:bold r:id="rId20"/>
       <p:italic r:id="rId21"/>
       <p:boldItalic r:id="rId22"/>
     </p:embeddedFont>
     <p:embeddedFont>
-      <p:font typeface="Lucida Sans Unicode" panose="020B0602030504020204" pitchFamily="34" charset="0"/>
+      <p:font typeface="Bahnschrift" panose="020B0502040204020203" pitchFamily="34" charset="0"/>
       <p:regular r:id="rId23"/>
+      <p:bold r:id="rId24"/>
     </p:embeddedFont>
     <p:embeddedFont>
-      <p:font typeface="Bahnschrift" panose="020B0502040204020203" pitchFamily="34" charset="0"/>
-      <p:regular r:id="rId24"/>
-      <p:bold r:id="rId25"/>
+      <p:font typeface="Josefin Sans" panose="020B0604020202020204" charset="0"/>
+      <p:regular r:id="rId25"/>
+      <p:bold r:id="rId26"/>
+      <p:italic r:id="rId27"/>
+      <p:boldItalic r:id="rId28"/>
+    </p:embeddedFont>
+    <p:embeddedFont>
+      <p:font typeface="Lucida Sans Unicode" panose="020B0602030504020204" pitchFamily="34" charset="0"/>
+      <p:regular r:id="rId29"/>
+    </p:embeddedFont>
+    <p:embeddedFont>
+      <p:font typeface="Roboto Thin" panose="020B0604020202020204" charset="0"/>
+      <p:regular r:id="rId30"/>
+      <p:bold r:id="rId31"/>
+      <p:italic r:id="rId32"/>
+      <p:boldItalic r:id="rId33"/>
     </p:embeddedFont>
     <p:embeddedFont>
       <p:font typeface="Gadugi" panose="020B0502040204020203" pitchFamily="34" charset="0"/>
-      <p:regular r:id="rId26"/>
-      <p:bold r:id="rId27"/>
-    </p:embeddedFont>
-    <p:embeddedFont>
-      <p:font typeface="Roboto Thin" panose="020B0604020202020204" charset="0"/>
-      <p:regular r:id="rId28"/>
-      <p:bold r:id="rId29"/>
-      <p:italic r:id="rId30"/>
-      <p:boldItalic r:id="rId31"/>
-    </p:embeddedFont>
-    <p:embeddedFont>
-      <p:font typeface="Roboto Light" panose="020B0604020202020204" charset="0"/>
-      <p:regular r:id="rId32"/>
-      <p:bold r:id="rId33"/>
-      <p:italic r:id="rId34"/>
-      <p:boldItalic r:id="rId35"/>
+      <p:regular r:id="rId34"/>
+      <p:bold r:id="rId35"/>
     </p:embeddedFont>
   </p:embeddedFontLst>
   <p:defaultTextStyle>
@@ -15367,7 +15367,7 @@
           <p:cNvPr id="14" name="Imagem 13">
             <a:extLst>
               <a:ext uri="{FF2B5EF4-FFF2-40B4-BE49-F238E27FC236}">
-                <a16:creationId xmlns="" xmlns:a16="http://schemas.microsoft.com/office/drawing/2014/main" id="{A1546BA2-A746-4D78-BA2A-66EACE53308E}"/>
+                <a16:creationId xmlns:a16="http://schemas.microsoft.com/office/drawing/2014/main" xmlns="" id="{A1546BA2-A746-4D78-BA2A-66EACE53308E}"/>
               </a:ext>
             </a:extLst>
           </p:cNvPr>
@@ -15665,7 +15665,7 @@
           <p:cNvPr id="14" name="Imagem 13">
             <a:extLst>
               <a:ext uri="{FF2B5EF4-FFF2-40B4-BE49-F238E27FC236}">
-                <a16:creationId xmlns="" xmlns:a16="http://schemas.microsoft.com/office/drawing/2014/main" id="{A1546BA2-A746-4D78-BA2A-66EACE53308E}"/>
+                <a16:creationId xmlns:a16="http://schemas.microsoft.com/office/drawing/2014/main" xmlns="" id="{A1546BA2-A746-4D78-BA2A-66EACE53308E}"/>
               </a:ext>
             </a:extLst>
           </p:cNvPr>
@@ -15969,7 +15969,7 @@
           <p:cNvPr id="14" name="Imagem 13">
             <a:extLst>
               <a:ext uri="{FF2B5EF4-FFF2-40B4-BE49-F238E27FC236}">
-                <a16:creationId xmlns="" xmlns:a16="http://schemas.microsoft.com/office/drawing/2014/main" id="{A1546BA2-A746-4D78-BA2A-66EACE53308E}"/>
+                <a16:creationId xmlns:a16="http://schemas.microsoft.com/office/drawing/2014/main" xmlns="" id="{A1546BA2-A746-4D78-BA2A-66EACE53308E}"/>
               </a:ext>
             </a:extLst>
           </p:cNvPr>
@@ -16278,7 +16278,7 @@
           <p:cNvPr id="14" name="Imagem 13">
             <a:extLst>
               <a:ext uri="{FF2B5EF4-FFF2-40B4-BE49-F238E27FC236}">
-                <a16:creationId xmlns="" xmlns:a16="http://schemas.microsoft.com/office/drawing/2014/main" id="{A1546BA2-A746-4D78-BA2A-66EACE53308E}"/>
+                <a16:creationId xmlns:a16="http://schemas.microsoft.com/office/drawing/2014/main" xmlns="" id="{A1546BA2-A746-4D78-BA2A-66EACE53308E}"/>
               </a:ext>
             </a:extLst>
           </p:cNvPr>
@@ -16785,7 +16785,7 @@
           <p:cNvPr id="8" name="Imagem 7">
             <a:extLst>
               <a:ext uri="{FF2B5EF4-FFF2-40B4-BE49-F238E27FC236}">
-                <a16:creationId xmlns="" xmlns:a16="http://schemas.microsoft.com/office/drawing/2014/main" id="{A1546BA2-A746-4D78-BA2A-66EACE53308E}"/>
+                <a16:creationId xmlns:a16="http://schemas.microsoft.com/office/drawing/2014/main" xmlns="" id="{A1546BA2-A746-4D78-BA2A-66EACE53308E}"/>
               </a:ext>
             </a:extLst>
           </p:cNvPr>
@@ -17758,7 +17758,7 @@
           <p:cNvPr id="8" name="Imagem 7">
             <a:extLst>
               <a:ext uri="{FF2B5EF4-FFF2-40B4-BE49-F238E27FC236}">
-                <a16:creationId xmlns="" xmlns:a16="http://schemas.microsoft.com/office/drawing/2014/main" id="{A1546BA2-A746-4D78-BA2A-66EACE53308E}"/>
+                <a16:creationId xmlns:a16="http://schemas.microsoft.com/office/drawing/2014/main" xmlns="" id="{A1546BA2-A746-4D78-BA2A-66EACE53308E}"/>
               </a:ext>
             </a:extLst>
           </p:cNvPr>
@@ -18591,13 +18591,13 @@
   <p:clrMapOvr>
     <a:masterClrMapping/>
   </p:clrMapOvr>
-  <mc:AlternateContent xmlns:mc="http://schemas.openxmlformats.org/markup-compatibility/2006">
-    <mc:Choice xmlns:p14="http://schemas.microsoft.com/office/powerpoint/2010/main" Requires="p14">
+  <mc:AlternateContent xmlns:mc="http://schemas.openxmlformats.org/markup-compatibility/2006" xmlns:p14="http://schemas.microsoft.com/office/powerpoint/2010/main">
+    <mc:Choice Requires="p14">
       <p:transition spd="med" p14:dur="700">
         <p:fade/>
       </p:transition>
     </mc:Choice>
-    <mc:Fallback>
+    <mc:Fallback xmlns="">
       <p:transition spd="med">
         <p:fade/>
       </p:transition>
@@ -18818,11 +18818,7 @@
             </a:r>
             <a:r>
               <a:rPr lang="pt-BR" sz="2700" dirty="0" smtClean="0"/>
-              <a:t>		</a:t>
-            </a:r>
-            <a:r>
-              <a:rPr lang="pt-BR" sz="2700" dirty="0" smtClean="0"/>
-              <a:t>PROJETO – HOME OFFICE</a:t>
+              <a:t>		PROJETO – HOME OFFICE</a:t>
             </a:r>
             <a:endParaRPr sz="2700" dirty="0">
               <a:sym typeface="Josefin Sans"/>
@@ -18835,7 +18831,7 @@
           <p:cNvPr id="7" name="Imagem 6">
             <a:extLst>
               <a:ext uri="{FF2B5EF4-FFF2-40B4-BE49-F238E27FC236}">
-                <a16:creationId xmlns="" xmlns:a16="http://schemas.microsoft.com/office/drawing/2014/main" id="{A1546BA2-A746-4D78-BA2A-66EACE53308E}"/>
+                <a16:creationId xmlns:a16="http://schemas.microsoft.com/office/drawing/2014/main" xmlns="" id="{A1546BA2-A746-4D78-BA2A-66EACE53308E}"/>
               </a:ext>
             </a:extLst>
           </p:cNvPr>
@@ -19033,13 +19029,13 @@
   <p:clrMapOvr>
     <a:masterClrMapping/>
   </p:clrMapOvr>
-  <mc:AlternateContent xmlns:mc="http://schemas.openxmlformats.org/markup-compatibility/2006">
-    <mc:Choice xmlns:p14="http://schemas.microsoft.com/office/powerpoint/2010/main" Requires="p14">
+  <mc:AlternateContent xmlns:mc="http://schemas.openxmlformats.org/markup-compatibility/2006" xmlns:p14="http://schemas.microsoft.com/office/powerpoint/2010/main">
+    <mc:Choice Requires="p14">
       <p:transition spd="med" p14:dur="700">
         <p:fade/>
       </p:transition>
     </mc:Choice>
-    <mc:Fallback>
+    <mc:Fallback xmlns="">
       <p:transition spd="med">
         <p:fade/>
       </p:transition>
@@ -19579,7 +19575,7 @@
           <p:cNvPr id="14" name="Imagem 13">
             <a:extLst>
               <a:ext uri="{FF2B5EF4-FFF2-40B4-BE49-F238E27FC236}">
-                <a16:creationId xmlns="" xmlns:a16="http://schemas.microsoft.com/office/drawing/2014/main" id="{A1546BA2-A746-4D78-BA2A-66EACE53308E}"/>
+                <a16:creationId xmlns:a16="http://schemas.microsoft.com/office/drawing/2014/main" xmlns="" id="{A1546BA2-A746-4D78-BA2A-66EACE53308E}"/>
               </a:ext>
             </a:extLst>
           </p:cNvPr>
@@ -19975,7 +19971,7 @@
           <p:cNvPr id="22" name="Imagem 21">
             <a:extLst>
               <a:ext uri="{FF2B5EF4-FFF2-40B4-BE49-F238E27FC236}">
-                <a16:creationId xmlns="" xmlns:a16="http://schemas.microsoft.com/office/drawing/2014/main" id="{A1546BA2-A746-4D78-BA2A-66EACE53308E}"/>
+                <a16:creationId xmlns:a16="http://schemas.microsoft.com/office/drawing/2014/main" xmlns="" id="{A1546BA2-A746-4D78-BA2A-66EACE53308E}"/>
               </a:ext>
             </a:extLst>
           </p:cNvPr>
@@ -21016,7 +21012,7 @@
           <p:cNvPr id="23" name="Imagem 22">
             <a:extLst>
               <a:ext uri="{FF2B5EF4-FFF2-40B4-BE49-F238E27FC236}">
-                <a16:creationId xmlns="" xmlns:a16="http://schemas.microsoft.com/office/drawing/2014/main" id="{A1546BA2-A746-4D78-BA2A-66EACE53308E}"/>
+                <a16:creationId xmlns:a16="http://schemas.microsoft.com/office/drawing/2014/main" xmlns="" id="{A1546BA2-A746-4D78-BA2A-66EACE53308E}"/>
               </a:ext>
             </a:extLst>
           </p:cNvPr>
@@ -21261,7 +21257,7 @@
           <p:cNvPr id="12" name="Imagem 11">
             <a:extLst>
               <a:ext uri="{FF2B5EF4-FFF2-40B4-BE49-F238E27FC236}">
-                <a16:creationId xmlns="" xmlns:a16="http://schemas.microsoft.com/office/drawing/2014/main" id="{A1546BA2-A746-4D78-BA2A-66EACE53308E}"/>
+                <a16:creationId xmlns:a16="http://schemas.microsoft.com/office/drawing/2014/main" xmlns="" id="{A1546BA2-A746-4D78-BA2A-66EACE53308E}"/>
               </a:ext>
             </a:extLst>
           </p:cNvPr>
@@ -21549,7 +21545,7 @@
           <p:cNvPr id="12" name="Imagem 11">
             <a:extLst>
               <a:ext uri="{FF2B5EF4-FFF2-40B4-BE49-F238E27FC236}">
-                <a16:creationId xmlns="" xmlns:a16="http://schemas.microsoft.com/office/drawing/2014/main" id="{A1546BA2-A746-4D78-BA2A-66EACE53308E}"/>
+                <a16:creationId xmlns:a16="http://schemas.microsoft.com/office/drawing/2014/main" xmlns="" id="{A1546BA2-A746-4D78-BA2A-66EACE53308E}"/>
               </a:ext>
             </a:extLst>
           </p:cNvPr>
@@ -21819,7 +21815,7 @@
           <p:cNvPr id="7" name="Imagem 6">
             <a:extLst>
               <a:ext uri="{FF2B5EF4-FFF2-40B4-BE49-F238E27FC236}">
-                <a16:creationId xmlns="" xmlns:a16="http://schemas.microsoft.com/office/drawing/2014/main" id="{A1546BA2-A746-4D78-BA2A-66EACE53308E}"/>
+                <a16:creationId xmlns:a16="http://schemas.microsoft.com/office/drawing/2014/main" xmlns="" id="{A1546BA2-A746-4D78-BA2A-66EACE53308E}"/>
               </a:ext>
             </a:extLst>
           </p:cNvPr>
@@ -21855,7 +21851,7 @@
           <p:cNvPr id="8" name="Imagem 7" descr="Uma imagem contendo relógio&#10;&#10;Descrição gerada automaticamente">
             <a:extLst>
               <a:ext uri="{FF2B5EF4-FFF2-40B4-BE49-F238E27FC236}">
-                <a16:creationId xmlns="" xmlns:a16="http://schemas.microsoft.com/office/drawing/2014/main" id="{EA954568-830E-4114-A575-5A8F5CE2BDC0}"/>
+                <a16:creationId xmlns:a16="http://schemas.microsoft.com/office/drawing/2014/main" xmlns="" id="{EA954568-830E-4114-A575-5A8F5CE2BDC0}"/>
               </a:ext>
             </a:extLst>
           </p:cNvPr>
@@ -22260,7 +22256,7 @@
           <p:cNvPr id="14" name="Imagem 13">
             <a:extLst>
               <a:ext uri="{FF2B5EF4-FFF2-40B4-BE49-F238E27FC236}">
-                <a16:creationId xmlns="" xmlns:a16="http://schemas.microsoft.com/office/drawing/2014/main" id="{A1546BA2-A746-4D78-BA2A-66EACE53308E}"/>
+                <a16:creationId xmlns:a16="http://schemas.microsoft.com/office/drawing/2014/main" xmlns="" id="{A1546BA2-A746-4D78-BA2A-66EACE53308E}"/>
               </a:ext>
             </a:extLst>
           </p:cNvPr>
@@ -22581,7 +22577,7 @@
           <p:cNvPr id="14" name="Imagem 13">
             <a:extLst>
               <a:ext uri="{FF2B5EF4-FFF2-40B4-BE49-F238E27FC236}">
-                <a16:creationId xmlns="" xmlns:a16="http://schemas.microsoft.com/office/drawing/2014/main" id="{A1546BA2-A746-4D78-BA2A-66EACE53308E}"/>
+                <a16:creationId xmlns:a16="http://schemas.microsoft.com/office/drawing/2014/main" xmlns="" id="{A1546BA2-A746-4D78-BA2A-66EACE53308E}"/>
               </a:ext>
             </a:extLst>
           </p:cNvPr>
@@ -22814,8 +22810,8 @@
         </p:nvSpPr>
         <p:spPr>
           <a:xfrm>
-            <a:off x="304721" y="1752600"/>
-            <a:ext cx="3973365" cy="3188163"/>
+            <a:off x="304721" y="1045030"/>
+            <a:ext cx="8635076" cy="4005942"/>
           </a:xfrm>
           <a:prstGeom prst="rect">
             <a:avLst/>
@@ -22827,13 +22823,25 @@
           </a:bodyPr>
           <a:lstStyle/>
           <a:p>
-            <a:pPr lvl="0"/>
+            <a:pPr algn="ctr"/>
             <a:r>
               <a:rPr lang="pt-BR" sz="2800" dirty="0" smtClean="0"/>
-              <a:t>WINDOWS</a:t>
+              <a:t>WINDOWS – LINUX UBUNTU (Virtual </a:t>
+            </a:r>
+            <a:r>
+              <a:rPr lang="pt-BR" sz="2800" dirty="0" err="1" smtClean="0"/>
+              <a:t>Machine</a:t>
+            </a:r>
+            <a:r>
+              <a:rPr lang="pt-BR" sz="2800" dirty="0" smtClean="0"/>
+              <a:t>)</a:t>
+            </a:r>
+            <a:r>
+              <a:rPr lang="pt-BR" sz="2800" dirty="0"/>
+              <a:t/>
             </a:r>
             <a:br>
-              <a:rPr lang="pt-BR" sz="2800" dirty="0" smtClean="0"/>
+              <a:rPr lang="pt-BR" sz="2800" dirty="0"/>
             </a:br>
             <a:r>
               <a:rPr lang="pt-BR" sz="2800" dirty="0" smtClean="0"/>
@@ -23168,38 +23176,12 @@
           </a:p>
         </p:txBody>
       </p:sp>
-      <p:cxnSp>
-        <p:nvCxnSpPr>
-          <p:cNvPr id="9" name="Google Shape;327;p20"/>
-          <p:cNvCxnSpPr/>
-          <p:nvPr/>
-        </p:nvCxnSpPr>
-        <p:spPr>
-          <a:xfrm flipH="1">
-            <a:off x="4616310" y="2351314"/>
-            <a:ext cx="3966" cy="2373086"/>
-          </a:xfrm>
-          <a:prstGeom prst="straightConnector1">
-            <a:avLst/>
-          </a:prstGeom>
-          <a:noFill/>
-          <a:ln w="19050" cap="flat" cmpd="sng">
-            <a:solidFill>
-              <a:srgbClr val="F3F3F3"/>
-            </a:solidFill>
-            <a:prstDash val="solid"/>
-            <a:round/>
-            <a:headEnd type="none" w="med" len="med"/>
-            <a:tailEnd type="none" w="med" len="med"/>
-          </a:ln>
-        </p:spPr>
-      </p:cxnSp>
       <p:pic>
         <p:nvPicPr>
           <p:cNvPr id="10" name="Imagem 9">
             <a:extLst>
               <a:ext uri="{FF2B5EF4-FFF2-40B4-BE49-F238E27FC236}">
-                <a16:creationId xmlns="" xmlns:a16="http://schemas.microsoft.com/office/drawing/2014/main" id="{A1546BA2-A746-4D78-BA2A-66EACE53308E}"/>
+                <a16:creationId xmlns:a16="http://schemas.microsoft.com/office/drawing/2014/main" xmlns="" id="{A1546BA2-A746-4D78-BA2A-66EACE53308E}"/>
               </a:ext>
             </a:extLst>
           </p:cNvPr>
@@ -23230,335 +23212,6 @@
           </a:prstGeom>
         </p:spPr>
       </p:pic>
-      <p:sp>
-        <p:nvSpPr>
-          <p:cNvPr id="11" name="Google Shape;325;p20"/>
-          <p:cNvSpPr txBox="1">
-            <a:spLocks/>
-          </p:cNvSpPr>
-          <p:nvPr/>
-        </p:nvSpPr>
-        <p:spPr>
-          <a:xfrm>
-            <a:off x="4966432" y="1752599"/>
-            <a:ext cx="3973365" cy="3188163"/>
-          </a:xfrm>
-          <a:prstGeom prst="rect">
-            <a:avLst/>
-          </a:prstGeom>
-          <a:noFill/>
-          <a:ln>
-            <a:noFill/>
-          </a:ln>
-        </p:spPr>
-        <p:txBody>
-          <a:bodyPr spcFirstLastPara="1" wrap="square" lIns="91425" tIns="91425" rIns="91425" bIns="91425" anchor="t" anchorCtr="0">
-            <a:noAutofit/>
-          </a:bodyPr>
-          <a:lstStyle>
-            <a:defPPr marR="0" lvl="0" algn="l" rtl="0">
-              <a:lnSpc>
-                <a:spcPct val="100000"/>
-              </a:lnSpc>
-              <a:spcBef>
-                <a:spcPts val="0"/>
-              </a:spcBef>
-              <a:spcAft>
-                <a:spcPts val="0"/>
-              </a:spcAft>
-            </a:defPPr>
-            <a:lvl1pPr marR="0" lvl="0" algn="l" rtl="0">
-              <a:lnSpc>
-                <a:spcPct val="100000"/>
-              </a:lnSpc>
-              <a:spcBef>
-                <a:spcPts val="0"/>
-              </a:spcBef>
-              <a:spcAft>
-                <a:spcPts val="0"/>
-              </a:spcAft>
-              <a:buClr>
-                <a:srgbClr val="F3F3F3"/>
-              </a:buClr>
-              <a:buSzPts val="6000"/>
-              <a:buFont typeface="Josefin Sans"/>
-              <a:buNone/>
-              <a:defRPr sz="5400" b="0" i="0" u="none" strike="noStrike" cap="none">
-                <a:solidFill>
-                  <a:srgbClr val="F3F3F3"/>
-                </a:solidFill>
-                <a:latin typeface="Josefin Sans"/>
-                <a:ea typeface="Josefin Sans"/>
-                <a:cs typeface="Josefin Sans"/>
-                <a:sym typeface="Josefin Sans"/>
-              </a:defRPr>
-            </a:lvl1pPr>
-            <a:lvl2pPr marR="0" lvl="1" algn="ctr" rtl="0">
-              <a:lnSpc>
-                <a:spcPct val="100000"/>
-              </a:lnSpc>
-              <a:spcBef>
-                <a:spcPts val="0"/>
-              </a:spcBef>
-              <a:spcAft>
-                <a:spcPts val="0"/>
-              </a:spcAft>
-              <a:buClr>
-                <a:srgbClr val="F3F3F3"/>
-              </a:buClr>
-              <a:buSzPts val="5200"/>
-              <a:buFont typeface="Arial"/>
-              <a:buNone/>
-              <a:defRPr sz="5200" b="0" i="0" u="none" strike="noStrike" cap="none">
-                <a:solidFill>
-                  <a:srgbClr val="F3F3F3"/>
-                </a:solidFill>
-                <a:latin typeface="Arial"/>
-                <a:ea typeface="Arial"/>
-                <a:cs typeface="Arial"/>
-                <a:sym typeface="Arial"/>
-              </a:defRPr>
-            </a:lvl2pPr>
-            <a:lvl3pPr marR="0" lvl="2" algn="ctr" rtl="0">
-              <a:lnSpc>
-                <a:spcPct val="100000"/>
-              </a:lnSpc>
-              <a:spcBef>
-                <a:spcPts val="0"/>
-              </a:spcBef>
-              <a:spcAft>
-                <a:spcPts val="0"/>
-              </a:spcAft>
-              <a:buClr>
-                <a:srgbClr val="F3F3F3"/>
-              </a:buClr>
-              <a:buSzPts val="5200"/>
-              <a:buFont typeface="Arial"/>
-              <a:buNone/>
-              <a:defRPr sz="5200" b="0" i="0" u="none" strike="noStrike" cap="none">
-                <a:solidFill>
-                  <a:srgbClr val="F3F3F3"/>
-                </a:solidFill>
-                <a:latin typeface="Arial"/>
-                <a:ea typeface="Arial"/>
-                <a:cs typeface="Arial"/>
-                <a:sym typeface="Arial"/>
-              </a:defRPr>
-            </a:lvl3pPr>
-            <a:lvl4pPr marR="0" lvl="3" algn="ctr" rtl="0">
-              <a:lnSpc>
-                <a:spcPct val="100000"/>
-              </a:lnSpc>
-              <a:spcBef>
-                <a:spcPts val="0"/>
-              </a:spcBef>
-              <a:spcAft>
-                <a:spcPts val="0"/>
-              </a:spcAft>
-              <a:buClr>
-                <a:srgbClr val="F3F3F3"/>
-              </a:buClr>
-              <a:buSzPts val="5200"/>
-              <a:buFont typeface="Arial"/>
-              <a:buNone/>
-              <a:defRPr sz="5200" b="0" i="0" u="none" strike="noStrike" cap="none">
-                <a:solidFill>
-                  <a:srgbClr val="F3F3F3"/>
-                </a:solidFill>
-                <a:latin typeface="Arial"/>
-                <a:ea typeface="Arial"/>
-                <a:cs typeface="Arial"/>
-                <a:sym typeface="Arial"/>
-              </a:defRPr>
-            </a:lvl4pPr>
-            <a:lvl5pPr marR="0" lvl="4" algn="ctr" rtl="0">
-              <a:lnSpc>
-                <a:spcPct val="100000"/>
-              </a:lnSpc>
-              <a:spcBef>
-                <a:spcPts val="0"/>
-              </a:spcBef>
-              <a:spcAft>
-                <a:spcPts val="0"/>
-              </a:spcAft>
-              <a:buClr>
-                <a:srgbClr val="F3F3F3"/>
-              </a:buClr>
-              <a:buSzPts val="5200"/>
-              <a:buFont typeface="Arial"/>
-              <a:buNone/>
-              <a:defRPr sz="5200" b="0" i="0" u="none" strike="noStrike" cap="none">
-                <a:solidFill>
-                  <a:srgbClr val="F3F3F3"/>
-                </a:solidFill>
-                <a:latin typeface="Arial"/>
-                <a:ea typeface="Arial"/>
-                <a:cs typeface="Arial"/>
-                <a:sym typeface="Arial"/>
-              </a:defRPr>
-            </a:lvl5pPr>
-            <a:lvl6pPr marR="0" lvl="5" algn="ctr" rtl="0">
-              <a:lnSpc>
-                <a:spcPct val="100000"/>
-              </a:lnSpc>
-              <a:spcBef>
-                <a:spcPts val="0"/>
-              </a:spcBef>
-              <a:spcAft>
-                <a:spcPts val="0"/>
-              </a:spcAft>
-              <a:buClr>
-                <a:srgbClr val="F3F3F3"/>
-              </a:buClr>
-              <a:buSzPts val="5200"/>
-              <a:buFont typeface="Arial"/>
-              <a:buNone/>
-              <a:defRPr sz="5200" b="0" i="0" u="none" strike="noStrike" cap="none">
-                <a:solidFill>
-                  <a:srgbClr val="F3F3F3"/>
-                </a:solidFill>
-                <a:latin typeface="Arial"/>
-                <a:ea typeface="Arial"/>
-                <a:cs typeface="Arial"/>
-                <a:sym typeface="Arial"/>
-              </a:defRPr>
-            </a:lvl6pPr>
-            <a:lvl7pPr marR="0" lvl="6" algn="ctr" rtl="0">
-              <a:lnSpc>
-                <a:spcPct val="100000"/>
-              </a:lnSpc>
-              <a:spcBef>
-                <a:spcPts val="0"/>
-              </a:spcBef>
-              <a:spcAft>
-                <a:spcPts val="0"/>
-              </a:spcAft>
-              <a:buClr>
-                <a:srgbClr val="F3F3F3"/>
-              </a:buClr>
-              <a:buSzPts val="5200"/>
-              <a:buFont typeface="Arial"/>
-              <a:buNone/>
-              <a:defRPr sz="5200" b="0" i="0" u="none" strike="noStrike" cap="none">
-                <a:solidFill>
-                  <a:srgbClr val="F3F3F3"/>
-                </a:solidFill>
-                <a:latin typeface="Arial"/>
-                <a:ea typeface="Arial"/>
-                <a:cs typeface="Arial"/>
-                <a:sym typeface="Arial"/>
-              </a:defRPr>
-            </a:lvl7pPr>
-            <a:lvl8pPr marR="0" lvl="7" algn="ctr" rtl="0">
-              <a:lnSpc>
-                <a:spcPct val="100000"/>
-              </a:lnSpc>
-              <a:spcBef>
-                <a:spcPts val="0"/>
-              </a:spcBef>
-              <a:spcAft>
-                <a:spcPts val="0"/>
-              </a:spcAft>
-              <a:buClr>
-                <a:srgbClr val="F3F3F3"/>
-              </a:buClr>
-              <a:buSzPts val="5200"/>
-              <a:buFont typeface="Arial"/>
-              <a:buNone/>
-              <a:defRPr sz="5200" b="0" i="0" u="none" strike="noStrike" cap="none">
-                <a:solidFill>
-                  <a:srgbClr val="F3F3F3"/>
-                </a:solidFill>
-                <a:latin typeface="Arial"/>
-                <a:ea typeface="Arial"/>
-                <a:cs typeface="Arial"/>
-                <a:sym typeface="Arial"/>
-              </a:defRPr>
-            </a:lvl8pPr>
-            <a:lvl9pPr marR="0" lvl="8" algn="ctr" rtl="0">
-              <a:lnSpc>
-                <a:spcPct val="100000"/>
-              </a:lnSpc>
-              <a:spcBef>
-                <a:spcPts val="0"/>
-              </a:spcBef>
-              <a:spcAft>
-                <a:spcPts val="0"/>
-              </a:spcAft>
-              <a:buClr>
-                <a:srgbClr val="F3F3F3"/>
-              </a:buClr>
-              <a:buSzPts val="5200"/>
-              <a:buFont typeface="Arial"/>
-              <a:buNone/>
-              <a:defRPr sz="5200" b="0" i="0" u="none" strike="noStrike" cap="none">
-                <a:solidFill>
-                  <a:srgbClr val="F3F3F3"/>
-                </a:solidFill>
-                <a:latin typeface="Arial"/>
-                <a:ea typeface="Arial"/>
-                <a:cs typeface="Arial"/>
-                <a:sym typeface="Arial"/>
-              </a:defRPr>
-            </a:lvl9pPr>
-          </a:lstStyle>
-          <a:p>
-            <a:r>
-              <a:rPr lang="pt-BR" sz="2800" dirty="0" smtClean="0"/>
-              <a:t>VIRTUAL MACHINE</a:t>
-            </a:r>
-          </a:p>
-          <a:p>
-            <a:r>
-              <a:rPr lang="pt-BR" sz="2800" dirty="0" smtClean="0"/>
-              <a:t>(Linux </a:t>
-            </a:r>
-            <a:r>
-              <a:rPr lang="pt-BR" sz="2800" dirty="0" err="1" smtClean="0"/>
-              <a:t>Ubuntu</a:t>
-            </a:r>
-            <a:r>
-              <a:rPr lang="pt-BR" sz="2800" dirty="0" smtClean="0"/>
-              <a:t>)</a:t>
-            </a:r>
-          </a:p>
-          <a:p>
-            <a:r>
-              <a:rPr lang="pt-BR" sz="2800" dirty="0" smtClean="0"/>
-              <a:t/>
-            </a:r>
-            <a:br>
-              <a:rPr lang="pt-BR" sz="2800" dirty="0" smtClean="0"/>
-            </a:br>
-            <a:r>
-              <a:rPr lang="pt-BR" sz="2800" dirty="0" smtClean="0"/>
-              <a:t>- OSHI</a:t>
-            </a:r>
-            <a:br>
-              <a:rPr lang="pt-BR" sz="2800" dirty="0" smtClean="0"/>
-            </a:br>
-            <a:r>
-              <a:rPr lang="pt-BR" sz="2800" dirty="0" smtClean="0"/>
-              <a:t>- Script de Instalação </a:t>
-            </a:r>
-            <a:br>
-              <a:rPr lang="pt-BR" sz="2800" dirty="0" smtClean="0"/>
-            </a:br>
-            <a:r>
-              <a:rPr lang="pt-BR" sz="2800" dirty="0" smtClean="0"/>
-              <a:t>- JAR Executável</a:t>
-            </a:r>
-            <a:br>
-              <a:rPr lang="pt-BR" sz="2800" dirty="0" smtClean="0"/>
-            </a:br>
-            <a:r>
-              <a:rPr lang="pt-BR" sz="2800" dirty="0" smtClean="0"/>
-              <a:t>- Alertas</a:t>
-            </a:r>
-            <a:endParaRPr lang="pt-BR" sz="4400" dirty="0"/>
-          </a:p>
-        </p:txBody>
-      </p:sp>
       <p:pic>
         <p:nvPicPr>
           <p:cNvPr id="13" name="Imagem 12"/>
@@ -23581,7 +23234,7 @@
         </p:blipFill>
         <p:spPr>
           <a:xfrm>
-            <a:off x="3617851" y="2394768"/>
+            <a:off x="463409" y="1781824"/>
             <a:ext cx="675092" cy="675092"/>
           </a:xfrm>
           <a:prstGeom prst="rect">
@@ -23610,7 +23263,7 @@
         </p:blipFill>
         <p:spPr>
           <a:xfrm>
-            <a:off x="8154679" y="2351314"/>
+            <a:off x="8001087" y="1738370"/>
             <a:ext cx="805544" cy="762000"/>
           </a:xfrm>
           <a:prstGeom prst="rect">
@@ -23628,13 +23281,13 @@
   <p:clrMapOvr>
     <a:masterClrMapping/>
   </p:clrMapOvr>
-  <mc:AlternateContent xmlns:mc="http://schemas.openxmlformats.org/markup-compatibility/2006">
-    <mc:Choice xmlns:p14="http://schemas.microsoft.com/office/powerpoint/2010/main" Requires="p14">
+  <mc:AlternateContent xmlns:mc="http://schemas.openxmlformats.org/markup-compatibility/2006" xmlns:p14="http://schemas.microsoft.com/office/powerpoint/2010/main">
+    <mc:Choice Requires="p14">
       <p:transition spd="med" p14:dur="700">
         <p:fade/>
       </p:transition>
     </mc:Choice>
-    <mc:Fallback>
+    <mc:Fallback xmlns="">
       <p:transition spd="med">
         <p:fade/>
       </p:transition>

</xml_diff>

<commit_message>
modificando o posicionamento de um slide
</commit_message>
<xml_diff>
--- a/Documentacao/Análise de sistemas/Slides KPRunnin - Sprint 3.pptx
+++ b/Documentacao/Análise de sistemas/Slides KPRunnin - Sprint 3.pptx
@@ -14,13 +14,13 @@
     <p:sldId id="288" r:id="rId5"/>
     <p:sldId id="289" r:id="rId6"/>
     <p:sldId id="314" r:id="rId7"/>
-    <p:sldId id="332" r:id="rId8"/>
-    <p:sldId id="320" r:id="rId9"/>
-    <p:sldId id="335" r:id="rId10"/>
-    <p:sldId id="312" r:id="rId11"/>
-    <p:sldId id="292" r:id="rId12"/>
-    <p:sldId id="291" r:id="rId13"/>
-    <p:sldId id="324" r:id="rId14"/>
+    <p:sldId id="324" r:id="rId8"/>
+    <p:sldId id="332" r:id="rId9"/>
+    <p:sldId id="320" r:id="rId10"/>
+    <p:sldId id="335" r:id="rId11"/>
+    <p:sldId id="312" r:id="rId12"/>
+    <p:sldId id="292" r:id="rId13"/>
+    <p:sldId id="291" r:id="rId14"/>
     <p:sldId id="336" r:id="rId15"/>
     <p:sldId id="334" r:id="rId16"/>
     <p:sldId id="330" r:id="rId17"/>
@@ -29,39 +29,39 @@
   <p:notesSz cx="6858000" cy="9144000"/>
   <p:embeddedFontLst>
     <p:embeddedFont>
-      <p:font typeface="Roboto Light" panose="020B0604020202020204" charset="0"/>
+      <p:font typeface="Gadugi" panose="020B0502040204020203" pitchFamily="34" charset="0"/>
       <p:regular r:id="rId19"/>
       <p:bold r:id="rId20"/>
-      <p:italic r:id="rId21"/>
-      <p:boldItalic r:id="rId22"/>
     </p:embeddedFont>
     <p:embeddedFont>
       <p:font typeface="Bahnschrift" panose="020B0502040204020203" pitchFamily="34" charset="0"/>
+      <p:regular r:id="rId21"/>
+      <p:bold r:id="rId22"/>
+    </p:embeddedFont>
+    <p:embeddedFont>
+      <p:font typeface="Roboto Thin" panose="020B0604020202020204" charset="0"/>
       <p:regular r:id="rId23"/>
       <p:bold r:id="rId24"/>
+      <p:italic r:id="rId25"/>
+      <p:boldItalic r:id="rId26"/>
+    </p:embeddedFont>
+    <p:embeddedFont>
+      <p:font typeface="Roboto Light" panose="020B0604020202020204" charset="0"/>
+      <p:regular r:id="rId27"/>
+      <p:bold r:id="rId28"/>
+      <p:italic r:id="rId29"/>
+      <p:boldItalic r:id="rId30"/>
     </p:embeddedFont>
     <p:embeddedFont>
       <p:font typeface="Josefin Sans" panose="020B0604020202020204" charset="0"/>
-      <p:regular r:id="rId25"/>
-      <p:bold r:id="rId26"/>
-      <p:italic r:id="rId27"/>
-      <p:boldItalic r:id="rId28"/>
+      <p:regular r:id="rId31"/>
+      <p:bold r:id="rId32"/>
+      <p:italic r:id="rId33"/>
+      <p:boldItalic r:id="rId34"/>
     </p:embeddedFont>
     <p:embeddedFont>
       <p:font typeface="Lucida Sans Unicode" panose="020B0602030504020204" pitchFamily="34" charset="0"/>
-      <p:regular r:id="rId29"/>
-    </p:embeddedFont>
-    <p:embeddedFont>
-      <p:font typeface="Roboto Thin" panose="020B0604020202020204" charset="0"/>
-      <p:regular r:id="rId30"/>
-      <p:bold r:id="rId31"/>
-      <p:italic r:id="rId32"/>
-      <p:boldItalic r:id="rId33"/>
-    </p:embeddedFont>
-    <p:embeddedFont>
-      <p:font typeface="Gadugi" panose="020B0502040204020203" pitchFamily="34" charset="0"/>
-      <p:regular r:id="rId34"/>
-      <p:bold r:id="rId35"/>
+      <p:regular r:id="rId35"/>
     </p:embeddedFont>
   </p:embeddedFontLst>
   <p:defaultTextStyle>
@@ -955,7 +955,7 @@
     </p:spTree>
     <p:extLst>
       <p:ext uri="{BB962C8B-B14F-4D97-AF65-F5344CB8AC3E}">
-        <p14:creationId xmlns:p14="http://schemas.microsoft.com/office/powerpoint/2010/main" val="1891666107"/>
+        <p14:creationId xmlns:p14="http://schemas.microsoft.com/office/powerpoint/2010/main" val="2023647941"/>
       </p:ext>
     </p:extLst>
   </p:cSld>
@@ -1064,7 +1064,7 @@
     </p:spTree>
     <p:extLst>
       <p:ext uri="{BB962C8B-B14F-4D97-AF65-F5344CB8AC3E}">
-        <p14:creationId xmlns:p14="http://schemas.microsoft.com/office/powerpoint/2010/main" val="3254058936"/>
+        <p14:creationId xmlns:p14="http://schemas.microsoft.com/office/powerpoint/2010/main" val="1891666107"/>
       </p:ext>
     </p:extLst>
   </p:cSld>
@@ -1173,7 +1173,7 @@
     </p:spTree>
     <p:extLst>
       <p:ext uri="{BB962C8B-B14F-4D97-AF65-F5344CB8AC3E}">
-        <p14:creationId xmlns:p14="http://schemas.microsoft.com/office/powerpoint/2010/main" val="3927447842"/>
+        <p14:creationId xmlns:p14="http://schemas.microsoft.com/office/powerpoint/2010/main" val="3254058936"/>
       </p:ext>
     </p:extLst>
   </p:cSld>
@@ -1282,7 +1282,7 @@
     </p:spTree>
     <p:extLst>
       <p:ext uri="{BB962C8B-B14F-4D97-AF65-F5344CB8AC3E}">
-        <p14:creationId xmlns:p14="http://schemas.microsoft.com/office/powerpoint/2010/main" val="2815089997"/>
+        <p14:creationId xmlns:p14="http://schemas.microsoft.com/office/powerpoint/2010/main" val="3927447842"/>
       </p:ext>
     </p:extLst>
   </p:cSld>
@@ -2263,7 +2263,7 @@
     </p:spTree>
     <p:extLst>
       <p:ext uri="{BB962C8B-B14F-4D97-AF65-F5344CB8AC3E}">
-        <p14:creationId xmlns:p14="http://schemas.microsoft.com/office/powerpoint/2010/main" val="2728702729"/>
+        <p14:creationId xmlns:p14="http://schemas.microsoft.com/office/powerpoint/2010/main" val="2815089997"/>
       </p:ext>
     </p:extLst>
   </p:cSld>
@@ -2372,7 +2372,7 @@
     </p:spTree>
     <p:extLst>
       <p:ext uri="{BB962C8B-B14F-4D97-AF65-F5344CB8AC3E}">
-        <p14:creationId xmlns:p14="http://schemas.microsoft.com/office/powerpoint/2010/main" val="1082504949"/>
+        <p14:creationId xmlns:p14="http://schemas.microsoft.com/office/powerpoint/2010/main" val="2728702729"/>
       </p:ext>
     </p:extLst>
   </p:cSld>
@@ -2481,7 +2481,7 @@
     </p:spTree>
     <p:extLst>
       <p:ext uri="{BB962C8B-B14F-4D97-AF65-F5344CB8AC3E}">
-        <p14:creationId xmlns:p14="http://schemas.microsoft.com/office/powerpoint/2010/main" val="2023647941"/>
+        <p14:creationId xmlns:p14="http://schemas.microsoft.com/office/powerpoint/2010/main" val="1082504949"/>
       </p:ext>
     </p:extLst>
   </p:cSld>
@@ -15367,7 +15367,7 @@
           <p:cNvPr id="14" name="Imagem 13">
             <a:extLst>
               <a:ext uri="{FF2B5EF4-FFF2-40B4-BE49-F238E27FC236}">
-                <a16:creationId xmlns:a16="http://schemas.microsoft.com/office/drawing/2014/main" xmlns="" id="{A1546BA2-A746-4D78-BA2A-66EACE53308E}"/>
+                <a16:creationId xmlns="" xmlns:a16="http://schemas.microsoft.com/office/drawing/2014/main" id="{A1546BA2-A746-4D78-BA2A-66EACE53308E}"/>
               </a:ext>
             </a:extLst>
           </p:cNvPr>
@@ -15595,77 +15595,378 @@
         </p:nvSpPr>
         <p:spPr>
           <a:xfrm>
-            <a:off x="720000" y="1073427"/>
-            <a:ext cx="6475457" cy="1719648"/>
+            <a:off x="304721" y="1045030"/>
+            <a:ext cx="8635076" cy="4005942"/>
           </a:xfrm>
           <a:prstGeom prst="rect">
             <a:avLst/>
           </a:prstGeom>
         </p:spPr>
         <p:txBody>
-          <a:bodyPr spcFirstLastPara="1" wrap="square" lIns="91425" tIns="91425" rIns="91425" bIns="91425" anchor="b" anchorCtr="0">
+          <a:bodyPr spcFirstLastPara="1" wrap="square" lIns="91425" tIns="91425" rIns="91425" bIns="91425" anchor="t" anchorCtr="0">
             <a:noAutofit/>
           </a:bodyPr>
           <a:lstStyle/>
           <a:p>
-            <a:pPr marL="0" lvl="0" indent="0" algn="l" rtl="0">
-              <a:spcBef>
-                <a:spcPts val="0"/>
-              </a:spcBef>
-              <a:spcAft>
-                <a:spcPts val="0"/>
-              </a:spcAft>
-              <a:buNone/>
-            </a:pPr>
+            <a:pPr algn="ctr"/>
             <a:r>
-              <a:rPr lang="pt-BR" sz="4400" dirty="0" smtClean="0"/>
-              <a:t>GERAÇÃO DE</a:t>
+              <a:rPr lang="pt-BR" sz="2800" dirty="0" smtClean="0"/>
+              <a:t>WINDOWS – LINUX UBUNTU (Virtual </a:t>
+            </a:r>
+            <a:r>
+              <a:rPr lang="pt-BR" sz="2800" dirty="0" err="1" smtClean="0"/>
+              <a:t>Machine</a:t>
+            </a:r>
+            <a:r>
+              <a:rPr lang="pt-BR" sz="2800" dirty="0" smtClean="0"/>
+              <a:t>)</a:t>
+            </a:r>
+            <a:r>
+              <a:rPr lang="pt-BR" sz="2800" dirty="0"/>
+              <a:t/>
             </a:r>
             <a:br>
-              <a:rPr lang="pt-BR" sz="4400" dirty="0" smtClean="0"/>
+              <a:rPr lang="pt-BR" sz="2800" dirty="0"/>
             </a:br>
             <a:r>
-              <a:rPr lang="pt-BR" sz="4400" dirty="0" smtClean="0"/>
-              <a:t>LOGS</a:t>
+              <a:rPr lang="pt-BR" sz="2800" dirty="0" smtClean="0"/>
+              <a:t/>
+            </a:r>
+            <a:br>
+              <a:rPr lang="pt-BR" sz="2800" dirty="0" smtClean="0"/>
+            </a:br>
+            <a:r>
+              <a:rPr lang="pt-BR" sz="2800" dirty="0" smtClean="0"/>
+              <a:t/>
+            </a:r>
+            <a:br>
+              <a:rPr lang="pt-BR" sz="2800" dirty="0" smtClean="0"/>
+            </a:br>
+            <a:r>
+              <a:rPr lang="pt-BR" sz="2800" dirty="0" smtClean="0"/>
+              <a:t>- </a:t>
+            </a:r>
+            <a:r>
+              <a:rPr lang="pt-BR" sz="2800" dirty="0"/>
+              <a:t>OSHI</a:t>
+            </a:r>
+            <a:br>
+              <a:rPr lang="pt-BR" sz="2800" dirty="0"/>
+            </a:br>
+            <a:r>
+              <a:rPr lang="pt-BR" sz="2800" dirty="0"/>
+              <a:t>- Script de Instalação </a:t>
+            </a:r>
+            <a:br>
+              <a:rPr lang="pt-BR" sz="2800" dirty="0"/>
+            </a:br>
+            <a:r>
+              <a:rPr lang="pt-BR" sz="2800" dirty="0"/>
+              <a:t>- JAR Executável</a:t>
+            </a:r>
+            <a:br>
+              <a:rPr lang="pt-BR" sz="2800" dirty="0"/>
+            </a:br>
+            <a:r>
+              <a:rPr lang="pt-BR" sz="2800" dirty="0"/>
+              <a:t>- Alertas</a:t>
             </a:r>
             <a:endParaRPr sz="4400" dirty="0">
+              <a:latin typeface="Josefin Sans"/>
+              <a:ea typeface="Josefin Sans"/>
+              <a:cs typeface="Josefin Sans"/>
               <a:sym typeface="Josefin Sans"/>
             </a:endParaRPr>
           </a:p>
         </p:txBody>
       </p:sp>
-      <p:cxnSp>
-        <p:nvCxnSpPr>
-          <p:cNvPr id="327" name="Google Shape;327;p20"/>
-          <p:cNvCxnSpPr/>
+      <p:sp>
+        <p:nvSpPr>
+          <p:cNvPr id="6" name="Google Shape;325;p20"/>
+          <p:cNvSpPr txBox="1">
+            <a:spLocks/>
+          </p:cNvSpPr>
           <p:nvPr/>
-        </p:nvCxnSpPr>
+        </p:nvSpPr>
         <p:spPr>
           <a:xfrm>
-            <a:off x="841434" y="2762125"/>
-            <a:ext cx="373800" cy="0"/>
+            <a:off x="1061779" y="175701"/>
+            <a:ext cx="4555250" cy="699691"/>
           </a:xfrm>
-          <a:prstGeom prst="straightConnector1">
+          <a:prstGeom prst="rect">
             <a:avLst/>
           </a:prstGeom>
           <a:noFill/>
-          <a:ln w="19050" cap="flat" cmpd="sng">
-            <a:solidFill>
-              <a:srgbClr val="F3F3F3"/>
-            </a:solidFill>
-            <a:prstDash val="solid"/>
-            <a:round/>
-            <a:headEnd type="none" w="med" len="med"/>
-            <a:tailEnd type="none" w="med" len="med"/>
+          <a:ln>
+            <a:noFill/>
           </a:ln>
         </p:spPr>
-      </p:cxnSp>
+        <p:txBody>
+          <a:bodyPr spcFirstLastPara="1" wrap="square" lIns="91425" tIns="91425" rIns="91425" bIns="91425" anchor="b" anchorCtr="0">
+            <a:noAutofit/>
+          </a:bodyPr>
+          <a:lstStyle>
+            <a:defPPr marR="0" lvl="0" algn="l" rtl="0">
+              <a:lnSpc>
+                <a:spcPct val="100000"/>
+              </a:lnSpc>
+              <a:spcBef>
+                <a:spcPts val="0"/>
+              </a:spcBef>
+              <a:spcAft>
+                <a:spcPts val="0"/>
+              </a:spcAft>
+            </a:defPPr>
+            <a:lvl1pPr marR="0" lvl="0" algn="l" rtl="0">
+              <a:lnSpc>
+                <a:spcPct val="100000"/>
+              </a:lnSpc>
+              <a:spcBef>
+                <a:spcPts val="0"/>
+              </a:spcBef>
+              <a:spcAft>
+                <a:spcPts val="0"/>
+              </a:spcAft>
+              <a:buClr>
+                <a:srgbClr val="F3F3F3"/>
+              </a:buClr>
+              <a:buSzPts val="6000"/>
+              <a:buFont typeface="Josefin Sans"/>
+              <a:buNone/>
+              <a:defRPr sz="5400" b="0" i="0" u="none" strike="noStrike" cap="none">
+                <a:solidFill>
+                  <a:srgbClr val="F3F3F3"/>
+                </a:solidFill>
+                <a:latin typeface="Josefin Sans"/>
+                <a:ea typeface="Josefin Sans"/>
+                <a:cs typeface="Josefin Sans"/>
+                <a:sym typeface="Josefin Sans"/>
+              </a:defRPr>
+            </a:lvl1pPr>
+            <a:lvl2pPr marR="0" lvl="1" algn="ctr" rtl="0">
+              <a:lnSpc>
+                <a:spcPct val="100000"/>
+              </a:lnSpc>
+              <a:spcBef>
+                <a:spcPts val="0"/>
+              </a:spcBef>
+              <a:spcAft>
+                <a:spcPts val="0"/>
+              </a:spcAft>
+              <a:buClr>
+                <a:srgbClr val="F3F3F3"/>
+              </a:buClr>
+              <a:buSzPts val="5200"/>
+              <a:buFont typeface="Arial"/>
+              <a:buNone/>
+              <a:defRPr sz="5200" b="0" i="0" u="none" strike="noStrike" cap="none">
+                <a:solidFill>
+                  <a:srgbClr val="F3F3F3"/>
+                </a:solidFill>
+                <a:latin typeface="Arial"/>
+                <a:ea typeface="Arial"/>
+                <a:cs typeface="Arial"/>
+                <a:sym typeface="Arial"/>
+              </a:defRPr>
+            </a:lvl2pPr>
+            <a:lvl3pPr marR="0" lvl="2" algn="ctr" rtl="0">
+              <a:lnSpc>
+                <a:spcPct val="100000"/>
+              </a:lnSpc>
+              <a:spcBef>
+                <a:spcPts val="0"/>
+              </a:spcBef>
+              <a:spcAft>
+                <a:spcPts val="0"/>
+              </a:spcAft>
+              <a:buClr>
+                <a:srgbClr val="F3F3F3"/>
+              </a:buClr>
+              <a:buSzPts val="5200"/>
+              <a:buFont typeface="Arial"/>
+              <a:buNone/>
+              <a:defRPr sz="5200" b="0" i="0" u="none" strike="noStrike" cap="none">
+                <a:solidFill>
+                  <a:srgbClr val="F3F3F3"/>
+                </a:solidFill>
+                <a:latin typeface="Arial"/>
+                <a:ea typeface="Arial"/>
+                <a:cs typeface="Arial"/>
+                <a:sym typeface="Arial"/>
+              </a:defRPr>
+            </a:lvl3pPr>
+            <a:lvl4pPr marR="0" lvl="3" algn="ctr" rtl="0">
+              <a:lnSpc>
+                <a:spcPct val="100000"/>
+              </a:lnSpc>
+              <a:spcBef>
+                <a:spcPts val="0"/>
+              </a:spcBef>
+              <a:spcAft>
+                <a:spcPts val="0"/>
+              </a:spcAft>
+              <a:buClr>
+                <a:srgbClr val="F3F3F3"/>
+              </a:buClr>
+              <a:buSzPts val="5200"/>
+              <a:buFont typeface="Arial"/>
+              <a:buNone/>
+              <a:defRPr sz="5200" b="0" i="0" u="none" strike="noStrike" cap="none">
+                <a:solidFill>
+                  <a:srgbClr val="F3F3F3"/>
+                </a:solidFill>
+                <a:latin typeface="Arial"/>
+                <a:ea typeface="Arial"/>
+                <a:cs typeface="Arial"/>
+                <a:sym typeface="Arial"/>
+              </a:defRPr>
+            </a:lvl4pPr>
+            <a:lvl5pPr marR="0" lvl="4" algn="ctr" rtl="0">
+              <a:lnSpc>
+                <a:spcPct val="100000"/>
+              </a:lnSpc>
+              <a:spcBef>
+                <a:spcPts val="0"/>
+              </a:spcBef>
+              <a:spcAft>
+                <a:spcPts val="0"/>
+              </a:spcAft>
+              <a:buClr>
+                <a:srgbClr val="F3F3F3"/>
+              </a:buClr>
+              <a:buSzPts val="5200"/>
+              <a:buFont typeface="Arial"/>
+              <a:buNone/>
+              <a:defRPr sz="5200" b="0" i="0" u="none" strike="noStrike" cap="none">
+                <a:solidFill>
+                  <a:srgbClr val="F3F3F3"/>
+                </a:solidFill>
+                <a:latin typeface="Arial"/>
+                <a:ea typeface="Arial"/>
+                <a:cs typeface="Arial"/>
+                <a:sym typeface="Arial"/>
+              </a:defRPr>
+            </a:lvl5pPr>
+            <a:lvl6pPr marR="0" lvl="5" algn="ctr" rtl="0">
+              <a:lnSpc>
+                <a:spcPct val="100000"/>
+              </a:lnSpc>
+              <a:spcBef>
+                <a:spcPts val="0"/>
+              </a:spcBef>
+              <a:spcAft>
+                <a:spcPts val="0"/>
+              </a:spcAft>
+              <a:buClr>
+                <a:srgbClr val="F3F3F3"/>
+              </a:buClr>
+              <a:buSzPts val="5200"/>
+              <a:buFont typeface="Arial"/>
+              <a:buNone/>
+              <a:defRPr sz="5200" b="0" i="0" u="none" strike="noStrike" cap="none">
+                <a:solidFill>
+                  <a:srgbClr val="F3F3F3"/>
+                </a:solidFill>
+                <a:latin typeface="Arial"/>
+                <a:ea typeface="Arial"/>
+                <a:cs typeface="Arial"/>
+                <a:sym typeface="Arial"/>
+              </a:defRPr>
+            </a:lvl6pPr>
+            <a:lvl7pPr marR="0" lvl="6" algn="ctr" rtl="0">
+              <a:lnSpc>
+                <a:spcPct val="100000"/>
+              </a:lnSpc>
+              <a:spcBef>
+                <a:spcPts val="0"/>
+              </a:spcBef>
+              <a:spcAft>
+                <a:spcPts val="0"/>
+              </a:spcAft>
+              <a:buClr>
+                <a:srgbClr val="F3F3F3"/>
+              </a:buClr>
+              <a:buSzPts val="5200"/>
+              <a:buFont typeface="Arial"/>
+              <a:buNone/>
+              <a:defRPr sz="5200" b="0" i="0" u="none" strike="noStrike" cap="none">
+                <a:solidFill>
+                  <a:srgbClr val="F3F3F3"/>
+                </a:solidFill>
+                <a:latin typeface="Arial"/>
+                <a:ea typeface="Arial"/>
+                <a:cs typeface="Arial"/>
+                <a:sym typeface="Arial"/>
+              </a:defRPr>
+            </a:lvl7pPr>
+            <a:lvl8pPr marR="0" lvl="7" algn="ctr" rtl="0">
+              <a:lnSpc>
+                <a:spcPct val="100000"/>
+              </a:lnSpc>
+              <a:spcBef>
+                <a:spcPts val="0"/>
+              </a:spcBef>
+              <a:spcAft>
+                <a:spcPts val="0"/>
+              </a:spcAft>
+              <a:buClr>
+                <a:srgbClr val="F3F3F3"/>
+              </a:buClr>
+              <a:buSzPts val="5200"/>
+              <a:buFont typeface="Arial"/>
+              <a:buNone/>
+              <a:defRPr sz="5200" b="0" i="0" u="none" strike="noStrike" cap="none">
+                <a:solidFill>
+                  <a:srgbClr val="F3F3F3"/>
+                </a:solidFill>
+                <a:latin typeface="Arial"/>
+                <a:ea typeface="Arial"/>
+                <a:cs typeface="Arial"/>
+                <a:sym typeface="Arial"/>
+              </a:defRPr>
+            </a:lvl8pPr>
+            <a:lvl9pPr marR="0" lvl="8" algn="ctr" rtl="0">
+              <a:lnSpc>
+                <a:spcPct val="100000"/>
+              </a:lnSpc>
+              <a:spcBef>
+                <a:spcPts val="0"/>
+              </a:spcBef>
+              <a:spcAft>
+                <a:spcPts val="0"/>
+              </a:spcAft>
+              <a:buClr>
+                <a:srgbClr val="F3F3F3"/>
+              </a:buClr>
+              <a:buSzPts val="5200"/>
+              <a:buFont typeface="Arial"/>
+              <a:buNone/>
+              <a:defRPr sz="5200" b="0" i="0" u="none" strike="noStrike" cap="none">
+                <a:solidFill>
+                  <a:srgbClr val="F3F3F3"/>
+                </a:solidFill>
+                <a:latin typeface="Arial"/>
+                <a:ea typeface="Arial"/>
+                <a:cs typeface="Arial"/>
+                <a:sym typeface="Arial"/>
+              </a:defRPr>
+            </a:lvl9pPr>
+          </a:lstStyle>
+          <a:p>
+            <a:r>
+              <a:rPr lang="pt-BR" sz="3200" dirty="0" smtClean="0"/>
+              <a:t>DEMONSTRAÇÃO</a:t>
+            </a:r>
+            <a:endParaRPr lang="pt-BR" sz="3200" dirty="0"/>
+          </a:p>
+        </p:txBody>
+      </p:sp>
       <p:pic>
         <p:nvPicPr>
-          <p:cNvPr id="14" name="Imagem 13">
+          <p:cNvPr id="10" name="Imagem 9">
             <a:extLst>
               <a:ext uri="{FF2B5EF4-FFF2-40B4-BE49-F238E27FC236}">
-                <a16:creationId xmlns:a16="http://schemas.microsoft.com/office/drawing/2014/main" xmlns="" id="{A1546BA2-A746-4D78-BA2A-66EACE53308E}"/>
+                <a16:creationId xmlns="" xmlns:a16="http://schemas.microsoft.com/office/drawing/2014/main" id="{A1546BA2-A746-4D78-BA2A-66EACE53308E}"/>
               </a:ext>
             </a:extLst>
           </p:cNvPr>
@@ -15688,8 +15989,67 @@
         </p:blipFill>
         <p:spPr>
           <a:xfrm>
-            <a:off x="6411514" y="1407885"/>
-            <a:ext cx="2133920" cy="2133920"/>
+            <a:off x="196483" y="175701"/>
+            <a:ext cx="533852" cy="533852"/>
+          </a:xfrm>
+          <a:prstGeom prst="rect">
+            <a:avLst/>
+          </a:prstGeom>
+        </p:spPr>
+      </p:pic>
+      <p:pic>
+        <p:nvPicPr>
+          <p:cNvPr id="13" name="Imagem 12"/>
+          <p:cNvPicPr>
+            <a:picLocks noChangeAspect="1"/>
+          </p:cNvPicPr>
+          <p:nvPr/>
+        </p:nvPicPr>
+        <p:blipFill>
+          <a:blip r:embed="rId4">
+            <a:extLst>
+              <a:ext uri="{28A0092B-C50C-407E-A947-70E740481C1C}">
+                <a14:useLocalDpi xmlns:a14="http://schemas.microsoft.com/office/drawing/2010/main" val="0"/>
+              </a:ext>
+            </a:extLst>
+          </a:blip>
+          <a:stretch>
+            <a:fillRect/>
+          </a:stretch>
+        </p:blipFill>
+        <p:spPr>
+          <a:xfrm>
+            <a:off x="463409" y="1781824"/>
+            <a:ext cx="675092" cy="675092"/>
+          </a:xfrm>
+          <a:prstGeom prst="rect">
+            <a:avLst/>
+          </a:prstGeom>
+        </p:spPr>
+      </p:pic>
+      <p:pic>
+        <p:nvPicPr>
+          <p:cNvPr id="5" name="Imagem 4"/>
+          <p:cNvPicPr>
+            <a:picLocks noChangeAspect="1"/>
+          </p:cNvPicPr>
+          <p:nvPr/>
+        </p:nvPicPr>
+        <p:blipFill rotWithShape="1">
+          <a:blip r:embed="rId5">
+            <a:extLst>
+              <a:ext uri="{28A0092B-C50C-407E-A947-70E740481C1C}">
+                <a14:useLocalDpi xmlns:a14="http://schemas.microsoft.com/office/drawing/2010/main" val="0"/>
+              </a:ext>
+            </a:extLst>
+          </a:blip>
+          <a:srcRect l="27066" r="15665" b="30348"/>
+          <a:stretch/>
+        </p:blipFill>
+        <p:spPr>
+          <a:xfrm>
+            <a:off x="8001087" y="1738370"/>
+            <a:ext cx="805544" cy="762000"/>
           </a:xfrm>
           <a:prstGeom prst="rect">
             <a:avLst/>
@@ -15699,7 +16059,7 @@
     </p:spTree>
     <p:extLst>
       <p:ext uri="{BB962C8B-B14F-4D97-AF65-F5344CB8AC3E}">
-        <p14:creationId xmlns:p14="http://schemas.microsoft.com/office/powerpoint/2010/main" val="3761580062"/>
+        <p14:creationId xmlns:p14="http://schemas.microsoft.com/office/powerpoint/2010/main" val="1238809662"/>
       </p:ext>
     </p:extLst>
   </p:cSld>
@@ -15898,8 +16258,8 @@
         </p:nvSpPr>
         <p:spPr>
           <a:xfrm>
-            <a:off x="720000" y="804075"/>
-            <a:ext cx="7704000" cy="1989000"/>
+            <a:off x="720000" y="1073427"/>
+            <a:ext cx="6475457" cy="1719648"/>
           </a:xfrm>
           <a:prstGeom prst="rect">
             <a:avLst/>
@@ -15921,18 +16281,17 @@
               <a:buNone/>
             </a:pPr>
             <a:r>
-              <a:rPr lang="pt-BR" sz="4400" dirty="0" smtClean="0">
-                <a:latin typeface="Josefin Sans"/>
-                <a:ea typeface="Josefin Sans"/>
-                <a:cs typeface="Josefin Sans"/>
-                <a:sym typeface="Josefin Sans"/>
-              </a:rPr>
-              <a:t>BOT VIA TELEGRAM</a:t>
+              <a:rPr lang="pt-BR" sz="4400" dirty="0" smtClean="0"/>
+              <a:t>GERAÇÃO DE</a:t>
+            </a:r>
+            <a:br>
+              <a:rPr lang="pt-BR" sz="4400" dirty="0" smtClean="0"/>
+            </a:br>
+            <a:r>
+              <a:rPr lang="pt-BR" sz="4400" dirty="0" smtClean="0"/>
+              <a:t>LOGS</a:t>
             </a:r>
             <a:endParaRPr sz="4400" dirty="0">
-              <a:latin typeface="Josefin Sans"/>
-              <a:ea typeface="Josefin Sans"/>
-              <a:cs typeface="Josefin Sans"/>
               <a:sym typeface="Josefin Sans"/>
             </a:endParaRPr>
           </a:p>
@@ -15969,7 +16328,7 @@
           <p:cNvPr id="14" name="Imagem 13">
             <a:extLst>
               <a:ext uri="{FF2B5EF4-FFF2-40B4-BE49-F238E27FC236}">
-                <a16:creationId xmlns:a16="http://schemas.microsoft.com/office/drawing/2014/main" xmlns="" id="{A1546BA2-A746-4D78-BA2A-66EACE53308E}"/>
+                <a16:creationId xmlns="" xmlns:a16="http://schemas.microsoft.com/office/drawing/2014/main" id="{A1546BA2-A746-4D78-BA2A-66EACE53308E}"/>
               </a:ext>
             </a:extLst>
           </p:cNvPr>
@@ -16003,7 +16362,7 @@
     </p:spTree>
     <p:extLst>
       <p:ext uri="{BB962C8B-B14F-4D97-AF65-F5344CB8AC3E}">
-        <p14:creationId xmlns:p14="http://schemas.microsoft.com/office/powerpoint/2010/main" val="1482589489"/>
+        <p14:creationId xmlns:p14="http://schemas.microsoft.com/office/powerpoint/2010/main" val="3761580062"/>
       </p:ext>
     </p:extLst>
   </p:cSld>
@@ -16202,8 +16561,8 @@
         </p:nvSpPr>
         <p:spPr>
           <a:xfrm>
-            <a:off x="720000" y="1172817"/>
-            <a:ext cx="6475457" cy="1620257"/>
+            <a:off x="720000" y="804075"/>
+            <a:ext cx="7704000" cy="1989000"/>
           </a:xfrm>
           <a:prstGeom prst="rect">
             <a:avLst/>
@@ -16226,22 +16585,17 @@
             </a:pPr>
             <a:r>
               <a:rPr lang="pt-BR" sz="4400" dirty="0" smtClean="0">
+                <a:latin typeface="Josefin Sans"/>
+                <a:ea typeface="Josefin Sans"/>
+                <a:cs typeface="Josefin Sans"/>
                 <a:sym typeface="Josefin Sans"/>
               </a:rPr>
-              <a:t>INSTITUCIONAL &amp;</a:t>
-            </a:r>
-            <a:br>
-              <a:rPr lang="pt-BR" sz="4400" dirty="0" smtClean="0">
-                <a:sym typeface="Josefin Sans"/>
-              </a:rPr>
-            </a:br>
-            <a:r>
-              <a:rPr lang="pt-BR" sz="4400" dirty="0" smtClean="0">
-                <a:sym typeface="Josefin Sans"/>
-              </a:rPr>
-              <a:t>DASHBOARD</a:t>
+              <a:t>BOT VIA TELEGRAM</a:t>
             </a:r>
             <a:endParaRPr sz="4400" dirty="0">
+              <a:latin typeface="Josefin Sans"/>
+              <a:ea typeface="Josefin Sans"/>
+              <a:cs typeface="Josefin Sans"/>
               <a:sym typeface="Josefin Sans"/>
             </a:endParaRPr>
           </a:p>
@@ -16278,7 +16632,7 @@
           <p:cNvPr id="14" name="Imagem 13">
             <a:extLst>
               <a:ext uri="{FF2B5EF4-FFF2-40B4-BE49-F238E27FC236}">
-                <a16:creationId xmlns:a16="http://schemas.microsoft.com/office/drawing/2014/main" xmlns="" id="{A1546BA2-A746-4D78-BA2A-66EACE53308E}"/>
+                <a16:creationId xmlns="" xmlns:a16="http://schemas.microsoft.com/office/drawing/2014/main" id="{A1546BA2-A746-4D78-BA2A-66EACE53308E}"/>
               </a:ext>
             </a:extLst>
           </p:cNvPr>
@@ -16312,7 +16666,7 @@
     </p:spTree>
     <p:extLst>
       <p:ext uri="{BB962C8B-B14F-4D97-AF65-F5344CB8AC3E}">
-        <p14:creationId xmlns:p14="http://schemas.microsoft.com/office/powerpoint/2010/main" val="2068368945"/>
+        <p14:creationId xmlns:p14="http://schemas.microsoft.com/office/powerpoint/2010/main" val="1482589489"/>
       </p:ext>
     </p:extLst>
   </p:cSld>
@@ -16501,291 +16855,93 @@
       </p:sp>
       <p:sp>
         <p:nvSpPr>
-          <p:cNvPr id="7" name="Google Shape;325;p20"/>
+          <p:cNvPr id="325" name="Google Shape;325;p20"/>
           <p:cNvSpPr txBox="1">
-            <a:spLocks/>
+            <a:spLocks noGrp="1"/>
           </p:cNvSpPr>
-          <p:nvPr/>
+          <p:nvPr>
+            <p:ph type="ctrTitle"/>
+          </p:nvPr>
         </p:nvSpPr>
         <p:spPr>
           <a:xfrm>
-            <a:off x="1061779" y="175701"/>
-            <a:ext cx="4176971" cy="699691"/>
+            <a:off x="720000" y="1172817"/>
+            <a:ext cx="6475457" cy="1620257"/>
           </a:xfrm>
           <a:prstGeom prst="rect">
             <a:avLst/>
           </a:prstGeom>
-          <a:noFill/>
-          <a:ln>
-            <a:noFill/>
-          </a:ln>
         </p:spPr>
         <p:txBody>
           <a:bodyPr spcFirstLastPara="1" wrap="square" lIns="91425" tIns="91425" rIns="91425" bIns="91425" anchor="b" anchorCtr="0">
             <a:noAutofit/>
           </a:bodyPr>
-          <a:lstStyle>
-            <a:defPPr marR="0" lvl="0" algn="l" rtl="0">
-              <a:lnSpc>
-                <a:spcPct val="100000"/>
-              </a:lnSpc>
-              <a:spcBef>
-                <a:spcPts val="0"/>
-              </a:spcBef>
-              <a:spcAft>
-                <a:spcPts val="0"/>
-              </a:spcAft>
-            </a:defPPr>
-            <a:lvl1pPr marR="0" lvl="0" algn="l" rtl="0">
-              <a:lnSpc>
-                <a:spcPct val="100000"/>
-              </a:lnSpc>
-              <a:spcBef>
-                <a:spcPts val="0"/>
-              </a:spcBef>
-              <a:spcAft>
-                <a:spcPts val="0"/>
-              </a:spcAft>
-              <a:buClr>
-                <a:srgbClr val="F3F3F3"/>
-              </a:buClr>
-              <a:buSzPts val="6000"/>
-              <a:buFont typeface="Josefin Sans"/>
-              <a:buNone/>
-              <a:defRPr sz="5400" b="0" i="0" u="none" strike="noStrike" cap="none">
-                <a:solidFill>
-                  <a:srgbClr val="F3F3F3"/>
-                </a:solidFill>
-                <a:latin typeface="Josefin Sans"/>
-                <a:ea typeface="Josefin Sans"/>
-                <a:cs typeface="Josefin Sans"/>
+          <a:lstStyle/>
+          <a:p>
+            <a:pPr marL="0" lvl="0" indent="0" algn="l" rtl="0">
+              <a:spcBef>
+                <a:spcPts val="0"/>
+              </a:spcBef>
+              <a:spcAft>
+                <a:spcPts val="0"/>
+              </a:spcAft>
+              <a:buNone/>
+            </a:pPr>
+            <a:r>
+              <a:rPr lang="pt-BR" sz="4400" dirty="0" smtClean="0">
                 <a:sym typeface="Josefin Sans"/>
-              </a:defRPr>
-            </a:lvl1pPr>
-            <a:lvl2pPr marR="0" lvl="1" algn="ctr" rtl="0">
-              <a:lnSpc>
-                <a:spcPct val="100000"/>
-              </a:lnSpc>
-              <a:spcBef>
-                <a:spcPts val="0"/>
-              </a:spcBef>
-              <a:spcAft>
-                <a:spcPts val="0"/>
-              </a:spcAft>
-              <a:buClr>
-                <a:srgbClr val="F3F3F3"/>
-              </a:buClr>
-              <a:buSzPts val="5200"/>
-              <a:buFont typeface="Arial"/>
-              <a:buNone/>
-              <a:defRPr sz="5200" b="0" i="0" u="none" strike="noStrike" cap="none">
-                <a:solidFill>
-                  <a:srgbClr val="F3F3F3"/>
-                </a:solidFill>
-                <a:latin typeface="Arial"/>
-                <a:ea typeface="Arial"/>
-                <a:cs typeface="Arial"/>
-                <a:sym typeface="Arial"/>
-              </a:defRPr>
-            </a:lvl2pPr>
-            <a:lvl3pPr marR="0" lvl="2" algn="ctr" rtl="0">
-              <a:lnSpc>
-                <a:spcPct val="100000"/>
-              </a:lnSpc>
-              <a:spcBef>
-                <a:spcPts val="0"/>
-              </a:spcBef>
-              <a:spcAft>
-                <a:spcPts val="0"/>
-              </a:spcAft>
-              <a:buClr>
-                <a:srgbClr val="F3F3F3"/>
-              </a:buClr>
-              <a:buSzPts val="5200"/>
-              <a:buFont typeface="Arial"/>
-              <a:buNone/>
-              <a:defRPr sz="5200" b="0" i="0" u="none" strike="noStrike" cap="none">
-                <a:solidFill>
-                  <a:srgbClr val="F3F3F3"/>
-                </a:solidFill>
-                <a:latin typeface="Arial"/>
-                <a:ea typeface="Arial"/>
-                <a:cs typeface="Arial"/>
-                <a:sym typeface="Arial"/>
-              </a:defRPr>
-            </a:lvl3pPr>
-            <a:lvl4pPr marR="0" lvl="3" algn="ctr" rtl="0">
-              <a:lnSpc>
-                <a:spcPct val="100000"/>
-              </a:lnSpc>
-              <a:spcBef>
-                <a:spcPts val="0"/>
-              </a:spcBef>
-              <a:spcAft>
-                <a:spcPts val="0"/>
-              </a:spcAft>
-              <a:buClr>
-                <a:srgbClr val="F3F3F3"/>
-              </a:buClr>
-              <a:buSzPts val="5200"/>
-              <a:buFont typeface="Arial"/>
-              <a:buNone/>
-              <a:defRPr sz="5200" b="0" i="0" u="none" strike="noStrike" cap="none">
-                <a:solidFill>
-                  <a:srgbClr val="F3F3F3"/>
-                </a:solidFill>
-                <a:latin typeface="Arial"/>
-                <a:ea typeface="Arial"/>
-                <a:cs typeface="Arial"/>
-                <a:sym typeface="Arial"/>
-              </a:defRPr>
-            </a:lvl4pPr>
-            <a:lvl5pPr marR="0" lvl="4" algn="ctr" rtl="0">
-              <a:lnSpc>
-                <a:spcPct val="100000"/>
-              </a:lnSpc>
-              <a:spcBef>
-                <a:spcPts val="0"/>
-              </a:spcBef>
-              <a:spcAft>
-                <a:spcPts val="0"/>
-              </a:spcAft>
-              <a:buClr>
-                <a:srgbClr val="F3F3F3"/>
-              </a:buClr>
-              <a:buSzPts val="5200"/>
-              <a:buFont typeface="Arial"/>
-              <a:buNone/>
-              <a:defRPr sz="5200" b="0" i="0" u="none" strike="noStrike" cap="none">
-                <a:solidFill>
-                  <a:srgbClr val="F3F3F3"/>
-                </a:solidFill>
-                <a:latin typeface="Arial"/>
-                <a:ea typeface="Arial"/>
-                <a:cs typeface="Arial"/>
-                <a:sym typeface="Arial"/>
-              </a:defRPr>
-            </a:lvl5pPr>
-            <a:lvl6pPr marR="0" lvl="5" algn="ctr" rtl="0">
-              <a:lnSpc>
-                <a:spcPct val="100000"/>
-              </a:lnSpc>
-              <a:spcBef>
-                <a:spcPts val="0"/>
-              </a:spcBef>
-              <a:spcAft>
-                <a:spcPts val="0"/>
-              </a:spcAft>
-              <a:buClr>
-                <a:srgbClr val="F3F3F3"/>
-              </a:buClr>
-              <a:buSzPts val="5200"/>
-              <a:buFont typeface="Arial"/>
-              <a:buNone/>
-              <a:defRPr sz="5200" b="0" i="0" u="none" strike="noStrike" cap="none">
-                <a:solidFill>
-                  <a:srgbClr val="F3F3F3"/>
-                </a:solidFill>
-                <a:latin typeface="Arial"/>
-                <a:ea typeface="Arial"/>
-                <a:cs typeface="Arial"/>
-                <a:sym typeface="Arial"/>
-              </a:defRPr>
-            </a:lvl6pPr>
-            <a:lvl7pPr marR="0" lvl="6" algn="ctr" rtl="0">
-              <a:lnSpc>
-                <a:spcPct val="100000"/>
-              </a:lnSpc>
-              <a:spcBef>
-                <a:spcPts val="0"/>
-              </a:spcBef>
-              <a:spcAft>
-                <a:spcPts val="0"/>
-              </a:spcAft>
-              <a:buClr>
-                <a:srgbClr val="F3F3F3"/>
-              </a:buClr>
-              <a:buSzPts val="5200"/>
-              <a:buFont typeface="Arial"/>
-              <a:buNone/>
-              <a:defRPr sz="5200" b="0" i="0" u="none" strike="noStrike" cap="none">
-                <a:solidFill>
-                  <a:srgbClr val="F3F3F3"/>
-                </a:solidFill>
-                <a:latin typeface="Arial"/>
-                <a:ea typeface="Arial"/>
-                <a:cs typeface="Arial"/>
-                <a:sym typeface="Arial"/>
-              </a:defRPr>
-            </a:lvl7pPr>
-            <a:lvl8pPr marR="0" lvl="7" algn="ctr" rtl="0">
-              <a:lnSpc>
-                <a:spcPct val="100000"/>
-              </a:lnSpc>
-              <a:spcBef>
-                <a:spcPts val="0"/>
-              </a:spcBef>
-              <a:spcAft>
-                <a:spcPts val="0"/>
-              </a:spcAft>
-              <a:buClr>
-                <a:srgbClr val="F3F3F3"/>
-              </a:buClr>
-              <a:buSzPts val="5200"/>
-              <a:buFont typeface="Arial"/>
-              <a:buNone/>
-              <a:defRPr sz="5200" b="0" i="0" u="none" strike="noStrike" cap="none">
-                <a:solidFill>
-                  <a:srgbClr val="F3F3F3"/>
-                </a:solidFill>
-                <a:latin typeface="Arial"/>
-                <a:ea typeface="Arial"/>
-                <a:cs typeface="Arial"/>
-                <a:sym typeface="Arial"/>
-              </a:defRPr>
-            </a:lvl8pPr>
-            <a:lvl9pPr marR="0" lvl="8" algn="ctr" rtl="0">
-              <a:lnSpc>
-                <a:spcPct val="100000"/>
-              </a:lnSpc>
-              <a:spcBef>
-                <a:spcPts val="0"/>
-              </a:spcBef>
-              <a:spcAft>
-                <a:spcPts val="0"/>
-              </a:spcAft>
-              <a:buClr>
-                <a:srgbClr val="F3F3F3"/>
-              </a:buClr>
-              <a:buSzPts val="5200"/>
-              <a:buFont typeface="Arial"/>
-              <a:buNone/>
-              <a:defRPr sz="5200" b="0" i="0" u="none" strike="noStrike" cap="none">
-                <a:solidFill>
-                  <a:srgbClr val="F3F3F3"/>
-                </a:solidFill>
-                <a:latin typeface="Arial"/>
-                <a:ea typeface="Arial"/>
-                <a:cs typeface="Arial"/>
-                <a:sym typeface="Arial"/>
-              </a:defRPr>
-            </a:lvl9pPr>
-          </a:lstStyle>
-          <a:p>
+              </a:rPr>
+              <a:t>INSTITUCIONAL &amp;</a:t>
+            </a:r>
+            <a:br>
+              <a:rPr lang="pt-BR" sz="4400" dirty="0" smtClean="0">
+                <a:sym typeface="Josefin Sans"/>
+              </a:rPr>
+            </a:br>
             <a:r>
-              <a:rPr lang="pt-BR" sz="3200" dirty="0" smtClean="0"/>
-              <a:t>TESTES DE CARGA</a:t>
+              <a:rPr lang="pt-BR" sz="4400" dirty="0" smtClean="0">
+                <a:sym typeface="Josefin Sans"/>
+              </a:rPr>
+              <a:t>DASHBOARD</a:t>
             </a:r>
-            <a:endParaRPr lang="pt-BR" sz="3200" dirty="0"/>
+            <a:endParaRPr sz="4400" dirty="0">
+              <a:sym typeface="Josefin Sans"/>
+            </a:endParaRPr>
           </a:p>
         </p:txBody>
       </p:sp>
+      <p:cxnSp>
+        <p:nvCxnSpPr>
+          <p:cNvPr id="327" name="Google Shape;327;p20"/>
+          <p:cNvCxnSpPr/>
+          <p:nvPr/>
+        </p:nvCxnSpPr>
+        <p:spPr>
+          <a:xfrm>
+            <a:off x="841434" y="2762125"/>
+            <a:ext cx="373800" cy="0"/>
+          </a:xfrm>
+          <a:prstGeom prst="straightConnector1">
+            <a:avLst/>
+          </a:prstGeom>
+          <a:noFill/>
+          <a:ln w="19050" cap="flat" cmpd="sng">
+            <a:solidFill>
+              <a:srgbClr val="F3F3F3"/>
+            </a:solidFill>
+            <a:prstDash val="solid"/>
+            <a:round/>
+            <a:headEnd type="none" w="med" len="med"/>
+            <a:tailEnd type="none" w="med" len="med"/>
+          </a:ln>
+        </p:spPr>
+      </p:cxnSp>
       <p:pic>
         <p:nvPicPr>
-          <p:cNvPr id="8" name="Imagem 7">
+          <p:cNvPr id="14" name="Imagem 13">
             <a:extLst>
               <a:ext uri="{FF2B5EF4-FFF2-40B4-BE49-F238E27FC236}">
-                <a16:creationId xmlns:a16="http://schemas.microsoft.com/office/drawing/2014/main" xmlns="" id="{A1546BA2-A746-4D78-BA2A-66EACE53308E}"/>
+                <a16:creationId xmlns="" xmlns:a16="http://schemas.microsoft.com/office/drawing/2014/main" id="{A1546BA2-A746-4D78-BA2A-66EACE53308E}"/>
               </a:ext>
             </a:extLst>
           </p:cNvPr>
@@ -16808,484 +16964,18 @@
         </p:blipFill>
         <p:spPr>
           <a:xfrm>
-            <a:off x="196483" y="175701"/>
-            <a:ext cx="533852" cy="533852"/>
+            <a:off x="6411514" y="1407885"/>
+            <a:ext cx="2133920" cy="2133920"/>
           </a:xfrm>
           <a:prstGeom prst="rect">
             <a:avLst/>
           </a:prstGeom>
         </p:spPr>
       </p:pic>
-      <p:sp>
-        <p:nvSpPr>
-          <p:cNvPr id="9" name="Google Shape;325;p20"/>
-          <p:cNvSpPr txBox="1">
-            <a:spLocks noGrp="1"/>
-          </p:cNvSpPr>
-          <p:nvPr>
-            <p:ph type="ctrTitle"/>
-          </p:nvPr>
-        </p:nvSpPr>
-        <p:spPr>
-          <a:xfrm>
-            <a:off x="304721" y="1752600"/>
-            <a:ext cx="3973365" cy="3188163"/>
-          </a:xfrm>
-          <a:prstGeom prst="rect">
-            <a:avLst/>
-          </a:prstGeom>
-        </p:spPr>
-        <p:txBody>
-          <a:bodyPr spcFirstLastPara="1" wrap="square" lIns="91425" tIns="91425" rIns="91425" bIns="91425" anchor="t" anchorCtr="0">
-            <a:noAutofit/>
-          </a:bodyPr>
-          <a:lstStyle/>
-          <a:p>
-            <a:pPr lvl="0"/>
-            <a:r>
-              <a:rPr lang="pt-BR" sz="2800" dirty="0" smtClean="0"/>
-              <a:t>POR QUE UTILIZAR?</a:t>
-            </a:r>
-            <a:br>
-              <a:rPr lang="pt-BR" sz="2800" dirty="0" smtClean="0"/>
-            </a:br>
-            <a:r>
-              <a:rPr lang="pt-BR" sz="2800" dirty="0" smtClean="0"/>
-              <a:t/>
-            </a:r>
-            <a:br>
-              <a:rPr lang="pt-BR" sz="2800" dirty="0" smtClean="0"/>
-            </a:br>
-            <a:r>
-              <a:rPr lang="pt-BR" sz="2200" dirty="0" smtClean="0"/>
-              <a:t>- Qualidade de software</a:t>
-            </a:r>
-            <a:r>
-              <a:rPr lang="pt-BR" sz="2200" dirty="0"/>
-              <a:t/>
-            </a:r>
-            <a:br>
-              <a:rPr lang="pt-BR" sz="2200" dirty="0"/>
-            </a:br>
-            <a:r>
-              <a:rPr lang="pt-BR" sz="2200" dirty="0"/>
-              <a:t>- </a:t>
-            </a:r>
-            <a:r>
-              <a:rPr lang="pt-BR" sz="2200" dirty="0" smtClean="0"/>
-              <a:t>Picos de usuários no sistema</a:t>
-            </a:r>
-            <a:r>
-              <a:rPr lang="pt-BR" sz="2200" dirty="0"/>
-              <a:t/>
-            </a:r>
-            <a:br>
-              <a:rPr lang="pt-BR" sz="2200" dirty="0"/>
-            </a:br>
-            <a:r>
-              <a:rPr lang="pt-BR" sz="2200" dirty="0"/>
-              <a:t>- </a:t>
-            </a:r>
-            <a:r>
-              <a:rPr lang="pt-BR" sz="2200" dirty="0" smtClean="0"/>
-              <a:t>Avaliar resultados de acordo com o esperado</a:t>
-            </a:r>
-            <a:r>
-              <a:rPr lang="pt-BR" sz="2200" dirty="0"/>
-              <a:t/>
-            </a:r>
-            <a:br>
-              <a:rPr lang="pt-BR" sz="2200" dirty="0"/>
-            </a:br>
-            <a:r>
-              <a:rPr lang="pt-BR" sz="2200" dirty="0"/>
-              <a:t>- </a:t>
-            </a:r>
-            <a:r>
-              <a:rPr lang="pt-BR" sz="2200" dirty="0" smtClean="0"/>
-              <a:t>Ferramenta gratuita e open </a:t>
-            </a:r>
-            <a:r>
-              <a:rPr lang="pt-BR" sz="2200" dirty="0" err="1" smtClean="0"/>
-              <a:t>source</a:t>
-            </a:r>
-            <a:endParaRPr sz="2200" dirty="0">
-              <a:sym typeface="Josefin Sans"/>
-            </a:endParaRPr>
-          </a:p>
-        </p:txBody>
-      </p:sp>
-      <p:cxnSp>
-        <p:nvCxnSpPr>
-          <p:cNvPr id="10" name="Google Shape;327;p20"/>
-          <p:cNvCxnSpPr/>
-          <p:nvPr/>
-        </p:nvCxnSpPr>
-        <p:spPr>
-          <a:xfrm flipH="1">
-            <a:off x="4616310" y="2351314"/>
-            <a:ext cx="3966" cy="2373086"/>
-          </a:xfrm>
-          <a:prstGeom prst="straightConnector1">
-            <a:avLst/>
-          </a:prstGeom>
-          <a:noFill/>
-          <a:ln w="19050" cap="flat" cmpd="sng">
-            <a:solidFill>
-              <a:srgbClr val="F3F3F3"/>
-            </a:solidFill>
-            <a:prstDash val="solid"/>
-            <a:round/>
-            <a:headEnd type="none" w="med" len="med"/>
-            <a:tailEnd type="none" w="med" len="med"/>
-          </a:ln>
-        </p:spPr>
-      </p:cxnSp>
-      <p:sp>
-        <p:nvSpPr>
-          <p:cNvPr id="11" name="Google Shape;325;p20"/>
-          <p:cNvSpPr txBox="1">
-            <a:spLocks/>
-          </p:cNvSpPr>
-          <p:nvPr/>
-        </p:nvSpPr>
-        <p:spPr>
-          <a:xfrm>
-            <a:off x="4966432" y="1752599"/>
-            <a:ext cx="3973365" cy="3188163"/>
-          </a:xfrm>
-          <a:prstGeom prst="rect">
-            <a:avLst/>
-          </a:prstGeom>
-          <a:noFill/>
-          <a:ln>
-            <a:noFill/>
-          </a:ln>
-        </p:spPr>
-        <p:txBody>
-          <a:bodyPr spcFirstLastPara="1" wrap="square" lIns="91425" tIns="91425" rIns="91425" bIns="91425" anchor="t" anchorCtr="0">
-            <a:noAutofit/>
-          </a:bodyPr>
-          <a:lstStyle>
-            <a:defPPr marR="0" lvl="0" algn="l" rtl="0">
-              <a:lnSpc>
-                <a:spcPct val="100000"/>
-              </a:lnSpc>
-              <a:spcBef>
-                <a:spcPts val="0"/>
-              </a:spcBef>
-              <a:spcAft>
-                <a:spcPts val="0"/>
-              </a:spcAft>
-            </a:defPPr>
-            <a:lvl1pPr marR="0" lvl="0" algn="l" rtl="0">
-              <a:lnSpc>
-                <a:spcPct val="100000"/>
-              </a:lnSpc>
-              <a:spcBef>
-                <a:spcPts val="0"/>
-              </a:spcBef>
-              <a:spcAft>
-                <a:spcPts val="0"/>
-              </a:spcAft>
-              <a:buClr>
-                <a:srgbClr val="F3F3F3"/>
-              </a:buClr>
-              <a:buSzPts val="6000"/>
-              <a:buFont typeface="Josefin Sans"/>
-              <a:buNone/>
-              <a:defRPr sz="5400" b="0" i="0" u="none" strike="noStrike" cap="none">
-                <a:solidFill>
-                  <a:srgbClr val="F3F3F3"/>
-                </a:solidFill>
-                <a:latin typeface="Josefin Sans"/>
-                <a:ea typeface="Josefin Sans"/>
-                <a:cs typeface="Josefin Sans"/>
-                <a:sym typeface="Josefin Sans"/>
-              </a:defRPr>
-            </a:lvl1pPr>
-            <a:lvl2pPr marR="0" lvl="1" algn="ctr" rtl="0">
-              <a:lnSpc>
-                <a:spcPct val="100000"/>
-              </a:lnSpc>
-              <a:spcBef>
-                <a:spcPts val="0"/>
-              </a:spcBef>
-              <a:spcAft>
-                <a:spcPts val="0"/>
-              </a:spcAft>
-              <a:buClr>
-                <a:srgbClr val="F3F3F3"/>
-              </a:buClr>
-              <a:buSzPts val="5200"/>
-              <a:buFont typeface="Arial"/>
-              <a:buNone/>
-              <a:defRPr sz="5200" b="0" i="0" u="none" strike="noStrike" cap="none">
-                <a:solidFill>
-                  <a:srgbClr val="F3F3F3"/>
-                </a:solidFill>
-                <a:latin typeface="Arial"/>
-                <a:ea typeface="Arial"/>
-                <a:cs typeface="Arial"/>
-                <a:sym typeface="Arial"/>
-              </a:defRPr>
-            </a:lvl2pPr>
-            <a:lvl3pPr marR="0" lvl="2" algn="ctr" rtl="0">
-              <a:lnSpc>
-                <a:spcPct val="100000"/>
-              </a:lnSpc>
-              <a:spcBef>
-                <a:spcPts val="0"/>
-              </a:spcBef>
-              <a:spcAft>
-                <a:spcPts val="0"/>
-              </a:spcAft>
-              <a:buClr>
-                <a:srgbClr val="F3F3F3"/>
-              </a:buClr>
-              <a:buSzPts val="5200"/>
-              <a:buFont typeface="Arial"/>
-              <a:buNone/>
-              <a:defRPr sz="5200" b="0" i="0" u="none" strike="noStrike" cap="none">
-                <a:solidFill>
-                  <a:srgbClr val="F3F3F3"/>
-                </a:solidFill>
-                <a:latin typeface="Arial"/>
-                <a:ea typeface="Arial"/>
-                <a:cs typeface="Arial"/>
-                <a:sym typeface="Arial"/>
-              </a:defRPr>
-            </a:lvl3pPr>
-            <a:lvl4pPr marR="0" lvl="3" algn="ctr" rtl="0">
-              <a:lnSpc>
-                <a:spcPct val="100000"/>
-              </a:lnSpc>
-              <a:spcBef>
-                <a:spcPts val="0"/>
-              </a:spcBef>
-              <a:spcAft>
-                <a:spcPts val="0"/>
-              </a:spcAft>
-              <a:buClr>
-                <a:srgbClr val="F3F3F3"/>
-              </a:buClr>
-              <a:buSzPts val="5200"/>
-              <a:buFont typeface="Arial"/>
-              <a:buNone/>
-              <a:defRPr sz="5200" b="0" i="0" u="none" strike="noStrike" cap="none">
-                <a:solidFill>
-                  <a:srgbClr val="F3F3F3"/>
-                </a:solidFill>
-                <a:latin typeface="Arial"/>
-                <a:ea typeface="Arial"/>
-                <a:cs typeface="Arial"/>
-                <a:sym typeface="Arial"/>
-              </a:defRPr>
-            </a:lvl4pPr>
-            <a:lvl5pPr marR="0" lvl="4" algn="ctr" rtl="0">
-              <a:lnSpc>
-                <a:spcPct val="100000"/>
-              </a:lnSpc>
-              <a:spcBef>
-                <a:spcPts val="0"/>
-              </a:spcBef>
-              <a:spcAft>
-                <a:spcPts val="0"/>
-              </a:spcAft>
-              <a:buClr>
-                <a:srgbClr val="F3F3F3"/>
-              </a:buClr>
-              <a:buSzPts val="5200"/>
-              <a:buFont typeface="Arial"/>
-              <a:buNone/>
-              <a:defRPr sz="5200" b="0" i="0" u="none" strike="noStrike" cap="none">
-                <a:solidFill>
-                  <a:srgbClr val="F3F3F3"/>
-                </a:solidFill>
-                <a:latin typeface="Arial"/>
-                <a:ea typeface="Arial"/>
-                <a:cs typeface="Arial"/>
-                <a:sym typeface="Arial"/>
-              </a:defRPr>
-            </a:lvl5pPr>
-            <a:lvl6pPr marR="0" lvl="5" algn="ctr" rtl="0">
-              <a:lnSpc>
-                <a:spcPct val="100000"/>
-              </a:lnSpc>
-              <a:spcBef>
-                <a:spcPts val="0"/>
-              </a:spcBef>
-              <a:spcAft>
-                <a:spcPts val="0"/>
-              </a:spcAft>
-              <a:buClr>
-                <a:srgbClr val="F3F3F3"/>
-              </a:buClr>
-              <a:buSzPts val="5200"/>
-              <a:buFont typeface="Arial"/>
-              <a:buNone/>
-              <a:defRPr sz="5200" b="0" i="0" u="none" strike="noStrike" cap="none">
-                <a:solidFill>
-                  <a:srgbClr val="F3F3F3"/>
-                </a:solidFill>
-                <a:latin typeface="Arial"/>
-                <a:ea typeface="Arial"/>
-                <a:cs typeface="Arial"/>
-                <a:sym typeface="Arial"/>
-              </a:defRPr>
-            </a:lvl6pPr>
-            <a:lvl7pPr marR="0" lvl="6" algn="ctr" rtl="0">
-              <a:lnSpc>
-                <a:spcPct val="100000"/>
-              </a:lnSpc>
-              <a:spcBef>
-                <a:spcPts val="0"/>
-              </a:spcBef>
-              <a:spcAft>
-                <a:spcPts val="0"/>
-              </a:spcAft>
-              <a:buClr>
-                <a:srgbClr val="F3F3F3"/>
-              </a:buClr>
-              <a:buSzPts val="5200"/>
-              <a:buFont typeface="Arial"/>
-              <a:buNone/>
-              <a:defRPr sz="5200" b="0" i="0" u="none" strike="noStrike" cap="none">
-                <a:solidFill>
-                  <a:srgbClr val="F3F3F3"/>
-                </a:solidFill>
-                <a:latin typeface="Arial"/>
-                <a:ea typeface="Arial"/>
-                <a:cs typeface="Arial"/>
-                <a:sym typeface="Arial"/>
-              </a:defRPr>
-            </a:lvl7pPr>
-            <a:lvl8pPr marR="0" lvl="7" algn="ctr" rtl="0">
-              <a:lnSpc>
-                <a:spcPct val="100000"/>
-              </a:lnSpc>
-              <a:spcBef>
-                <a:spcPts val="0"/>
-              </a:spcBef>
-              <a:spcAft>
-                <a:spcPts val="0"/>
-              </a:spcAft>
-              <a:buClr>
-                <a:srgbClr val="F3F3F3"/>
-              </a:buClr>
-              <a:buSzPts val="5200"/>
-              <a:buFont typeface="Arial"/>
-              <a:buNone/>
-              <a:defRPr sz="5200" b="0" i="0" u="none" strike="noStrike" cap="none">
-                <a:solidFill>
-                  <a:srgbClr val="F3F3F3"/>
-                </a:solidFill>
-                <a:latin typeface="Arial"/>
-                <a:ea typeface="Arial"/>
-                <a:cs typeface="Arial"/>
-                <a:sym typeface="Arial"/>
-              </a:defRPr>
-            </a:lvl8pPr>
-            <a:lvl9pPr marR="0" lvl="8" algn="ctr" rtl="0">
-              <a:lnSpc>
-                <a:spcPct val="100000"/>
-              </a:lnSpc>
-              <a:spcBef>
-                <a:spcPts val="0"/>
-              </a:spcBef>
-              <a:spcAft>
-                <a:spcPts val="0"/>
-              </a:spcAft>
-              <a:buClr>
-                <a:srgbClr val="F3F3F3"/>
-              </a:buClr>
-              <a:buSzPts val="5200"/>
-              <a:buFont typeface="Arial"/>
-              <a:buNone/>
-              <a:defRPr sz="5200" b="0" i="0" u="none" strike="noStrike" cap="none">
-                <a:solidFill>
-                  <a:srgbClr val="F3F3F3"/>
-                </a:solidFill>
-                <a:latin typeface="Arial"/>
-                <a:ea typeface="Arial"/>
-                <a:cs typeface="Arial"/>
-                <a:sym typeface="Arial"/>
-              </a:defRPr>
-            </a:lvl9pPr>
-          </a:lstStyle>
-          <a:p>
-            <a:r>
-              <a:rPr lang="pt-BR" sz="2800" dirty="0" smtClean="0"/>
-              <a:t>ONDE ATUA?</a:t>
-            </a:r>
-          </a:p>
-          <a:p>
-            <a:r>
-              <a:rPr lang="pt-BR" sz="2800" dirty="0" smtClean="0"/>
-              <a:t/>
-            </a:r>
-            <a:br>
-              <a:rPr lang="pt-BR" sz="2800" dirty="0" smtClean="0"/>
-            </a:br>
-            <a:r>
-              <a:rPr lang="pt-BR" sz="2800" dirty="0" smtClean="0"/>
-              <a:t>- Nos pontos de vendas</a:t>
-            </a:r>
-          </a:p>
-          <a:p>
-            <a:r>
-              <a:rPr lang="pt-BR" sz="2800" dirty="0" smtClean="0"/>
-              <a:t>- Levantamento de dados das compras dos clientes</a:t>
-            </a:r>
-          </a:p>
-          <a:p>
-            <a:r>
-              <a:rPr lang="pt-BR" sz="2800" dirty="0" smtClean="0"/>
-              <a:t>- Limites de sistema</a:t>
-            </a:r>
-          </a:p>
-          <a:p>
-            <a:endParaRPr lang="pt-BR" sz="2800" dirty="0" smtClean="0"/>
-          </a:p>
-        </p:txBody>
-      </p:sp>
-      <p:pic>
-        <p:nvPicPr>
-          <p:cNvPr id="2" name="Imagem 1"/>
-          <p:cNvPicPr>
-            <a:picLocks noChangeAspect="1"/>
-          </p:cNvPicPr>
-          <p:nvPr/>
-        </p:nvPicPr>
-        <p:blipFill>
-          <a:blip r:embed="rId4">
-            <a:extLst>
-              <a:ext uri="{28A0092B-C50C-407E-A947-70E740481C1C}">
-                <a14:useLocalDpi xmlns:a14="http://schemas.microsoft.com/office/drawing/2010/main" val="0"/>
-              </a:ext>
-            </a:extLst>
-          </a:blip>
-          <a:stretch>
-            <a:fillRect/>
-          </a:stretch>
-        </p:blipFill>
-        <p:spPr>
-          <a:xfrm>
-            <a:off x="3430524" y="875392"/>
-            <a:ext cx="2371572" cy="805697"/>
-          </a:xfrm>
-          <a:prstGeom prst="rect">
-            <a:avLst/>
-          </a:prstGeom>
-          <a:solidFill>
-            <a:srgbClr val="303030"/>
-          </a:solidFill>
-        </p:spPr>
-      </p:pic>
     </p:spTree>
     <p:extLst>
       <p:ext uri="{BB962C8B-B14F-4D97-AF65-F5344CB8AC3E}">
-        <p14:creationId xmlns:p14="http://schemas.microsoft.com/office/powerpoint/2010/main" val="2005515087"/>
+        <p14:creationId xmlns:p14="http://schemas.microsoft.com/office/powerpoint/2010/main" val="2068368945"/>
       </p:ext>
     </p:extLst>
   </p:cSld>
@@ -17758,7 +17448,7 @@
           <p:cNvPr id="8" name="Imagem 7">
             <a:extLst>
               <a:ext uri="{FF2B5EF4-FFF2-40B4-BE49-F238E27FC236}">
-                <a16:creationId xmlns:a16="http://schemas.microsoft.com/office/drawing/2014/main" xmlns="" id="{A1546BA2-A746-4D78-BA2A-66EACE53308E}"/>
+                <a16:creationId xmlns="" xmlns:a16="http://schemas.microsoft.com/office/drawing/2014/main" id="{A1546BA2-A746-4D78-BA2A-66EACE53308E}"/>
               </a:ext>
             </a:extLst>
           </p:cNvPr>
@@ -18831,7 +18521,7 @@
           <p:cNvPr id="7" name="Imagem 6">
             <a:extLst>
               <a:ext uri="{FF2B5EF4-FFF2-40B4-BE49-F238E27FC236}">
-                <a16:creationId xmlns:a16="http://schemas.microsoft.com/office/drawing/2014/main" xmlns="" id="{A1546BA2-A746-4D78-BA2A-66EACE53308E}"/>
+                <a16:creationId xmlns="" xmlns:a16="http://schemas.microsoft.com/office/drawing/2014/main" id="{A1546BA2-A746-4D78-BA2A-66EACE53308E}"/>
               </a:ext>
             </a:extLst>
           </p:cNvPr>
@@ -19575,7 +19265,7 @@
           <p:cNvPr id="14" name="Imagem 13">
             <a:extLst>
               <a:ext uri="{FF2B5EF4-FFF2-40B4-BE49-F238E27FC236}">
-                <a16:creationId xmlns:a16="http://schemas.microsoft.com/office/drawing/2014/main" xmlns="" id="{A1546BA2-A746-4D78-BA2A-66EACE53308E}"/>
+                <a16:creationId xmlns="" xmlns:a16="http://schemas.microsoft.com/office/drawing/2014/main" id="{A1546BA2-A746-4D78-BA2A-66EACE53308E}"/>
               </a:ext>
             </a:extLst>
           </p:cNvPr>
@@ -19971,7 +19661,7 @@
           <p:cNvPr id="22" name="Imagem 21">
             <a:extLst>
               <a:ext uri="{FF2B5EF4-FFF2-40B4-BE49-F238E27FC236}">
-                <a16:creationId xmlns:a16="http://schemas.microsoft.com/office/drawing/2014/main" xmlns="" id="{A1546BA2-A746-4D78-BA2A-66EACE53308E}"/>
+                <a16:creationId xmlns="" xmlns:a16="http://schemas.microsoft.com/office/drawing/2014/main" id="{A1546BA2-A746-4D78-BA2A-66EACE53308E}"/>
               </a:ext>
             </a:extLst>
           </p:cNvPr>
@@ -21012,7 +20702,7 @@
           <p:cNvPr id="23" name="Imagem 22">
             <a:extLst>
               <a:ext uri="{FF2B5EF4-FFF2-40B4-BE49-F238E27FC236}">
-                <a16:creationId xmlns:a16="http://schemas.microsoft.com/office/drawing/2014/main" xmlns="" id="{A1546BA2-A746-4D78-BA2A-66EACE53308E}"/>
+                <a16:creationId xmlns="" xmlns:a16="http://schemas.microsoft.com/office/drawing/2014/main" id="{A1546BA2-A746-4D78-BA2A-66EACE53308E}"/>
               </a:ext>
             </a:extLst>
           </p:cNvPr>
@@ -21257,7 +20947,7 @@
           <p:cNvPr id="12" name="Imagem 11">
             <a:extLst>
               <a:ext uri="{FF2B5EF4-FFF2-40B4-BE49-F238E27FC236}">
-                <a16:creationId xmlns:a16="http://schemas.microsoft.com/office/drawing/2014/main" xmlns="" id="{A1546BA2-A746-4D78-BA2A-66EACE53308E}"/>
+                <a16:creationId xmlns="" xmlns:a16="http://schemas.microsoft.com/office/drawing/2014/main" id="{A1546BA2-A746-4D78-BA2A-66EACE53308E}"/>
               </a:ext>
             </a:extLst>
           </p:cNvPr>
@@ -21545,7 +21235,7 @@
           <p:cNvPr id="12" name="Imagem 11">
             <a:extLst>
               <a:ext uri="{FF2B5EF4-FFF2-40B4-BE49-F238E27FC236}">
-                <a16:creationId xmlns:a16="http://schemas.microsoft.com/office/drawing/2014/main" xmlns="" id="{A1546BA2-A746-4D78-BA2A-66EACE53308E}"/>
+                <a16:creationId xmlns="" xmlns:a16="http://schemas.microsoft.com/office/drawing/2014/main" id="{A1546BA2-A746-4D78-BA2A-66EACE53308E}"/>
               </a:ext>
             </a:extLst>
           </p:cNvPr>
@@ -21815,7 +21505,7 @@
           <p:cNvPr id="7" name="Imagem 6">
             <a:extLst>
               <a:ext uri="{FF2B5EF4-FFF2-40B4-BE49-F238E27FC236}">
-                <a16:creationId xmlns:a16="http://schemas.microsoft.com/office/drawing/2014/main" xmlns="" id="{A1546BA2-A746-4D78-BA2A-66EACE53308E}"/>
+                <a16:creationId xmlns="" xmlns:a16="http://schemas.microsoft.com/office/drawing/2014/main" id="{A1546BA2-A746-4D78-BA2A-66EACE53308E}"/>
               </a:ext>
             </a:extLst>
           </p:cNvPr>
@@ -21851,7 +21541,7 @@
           <p:cNvPr id="8" name="Imagem 7" descr="Uma imagem contendo relógio&#10;&#10;Descrição gerada automaticamente">
             <a:extLst>
               <a:ext uri="{FF2B5EF4-FFF2-40B4-BE49-F238E27FC236}">
-                <a16:creationId xmlns:a16="http://schemas.microsoft.com/office/drawing/2014/main" xmlns="" id="{EA954568-830E-4114-A575-5A8F5CE2BDC0}"/>
+                <a16:creationId xmlns="" xmlns:a16="http://schemas.microsoft.com/office/drawing/2014/main" id="{EA954568-830E-4114-A575-5A8F5CE2BDC0}"/>
               </a:ext>
             </a:extLst>
           </p:cNvPr>
@@ -22175,88 +21865,291 @@
       </p:sp>
       <p:sp>
         <p:nvSpPr>
-          <p:cNvPr id="325" name="Google Shape;325;p20"/>
+          <p:cNvPr id="7" name="Google Shape;325;p20"/>
           <p:cNvSpPr txBox="1">
-            <a:spLocks noGrp="1"/>
+            <a:spLocks/>
           </p:cNvSpPr>
-          <p:nvPr>
-            <p:ph type="ctrTitle"/>
-          </p:nvPr>
+          <p:nvPr/>
         </p:nvSpPr>
         <p:spPr>
           <a:xfrm>
-            <a:off x="720000" y="804075"/>
-            <a:ext cx="7704000" cy="1989000"/>
+            <a:off x="1061779" y="175701"/>
+            <a:ext cx="4176971" cy="699691"/>
           </a:xfrm>
           <a:prstGeom prst="rect">
             <a:avLst/>
           </a:prstGeom>
+          <a:noFill/>
+          <a:ln>
+            <a:noFill/>
+          </a:ln>
         </p:spPr>
         <p:txBody>
           <a:bodyPr spcFirstLastPara="1" wrap="square" lIns="91425" tIns="91425" rIns="91425" bIns="91425" anchor="b" anchorCtr="0">
             <a:noAutofit/>
           </a:bodyPr>
-          <a:lstStyle/>
-          <a:p>
-            <a:pPr marL="0" lvl="0" indent="0" algn="l" rtl="0">
-              <a:spcBef>
-                <a:spcPts val="0"/>
-              </a:spcBef>
-              <a:spcAft>
-                <a:spcPts val="0"/>
-              </a:spcAft>
-              <a:buNone/>
-            </a:pPr>
-            <a:r>
-              <a:rPr lang="pt-BR" dirty="0" smtClean="0">
+          <a:lstStyle>
+            <a:defPPr marR="0" lvl="0" algn="l" rtl="0">
+              <a:lnSpc>
+                <a:spcPct val="100000"/>
+              </a:lnSpc>
+              <a:spcBef>
+                <a:spcPts val="0"/>
+              </a:spcBef>
+              <a:spcAft>
+                <a:spcPts val="0"/>
+              </a:spcAft>
+            </a:defPPr>
+            <a:lvl1pPr marR="0" lvl="0" algn="l" rtl="0">
+              <a:lnSpc>
+                <a:spcPct val="100000"/>
+              </a:lnSpc>
+              <a:spcBef>
+                <a:spcPts val="0"/>
+              </a:spcBef>
+              <a:spcAft>
+                <a:spcPts val="0"/>
+              </a:spcAft>
+              <a:buClr>
+                <a:srgbClr val="F3F3F3"/>
+              </a:buClr>
+              <a:buSzPts val="6000"/>
+              <a:buFont typeface="Josefin Sans"/>
+              <a:buNone/>
+              <a:defRPr sz="5400" b="0" i="0" u="none" strike="noStrike" cap="none">
+                <a:solidFill>
+                  <a:srgbClr val="F3F3F3"/>
+                </a:solidFill>
                 <a:latin typeface="Josefin Sans"/>
                 <a:ea typeface="Josefin Sans"/>
                 <a:cs typeface="Josefin Sans"/>
                 <a:sym typeface="Josefin Sans"/>
-              </a:rPr>
-              <a:t>STORYBOARD</a:t>
+              </a:defRPr>
+            </a:lvl1pPr>
+            <a:lvl2pPr marR="0" lvl="1" algn="ctr" rtl="0">
+              <a:lnSpc>
+                <a:spcPct val="100000"/>
+              </a:lnSpc>
+              <a:spcBef>
+                <a:spcPts val="0"/>
+              </a:spcBef>
+              <a:spcAft>
+                <a:spcPts val="0"/>
+              </a:spcAft>
+              <a:buClr>
+                <a:srgbClr val="F3F3F3"/>
+              </a:buClr>
+              <a:buSzPts val="5200"/>
+              <a:buFont typeface="Arial"/>
+              <a:buNone/>
+              <a:defRPr sz="5200" b="0" i="0" u="none" strike="noStrike" cap="none">
+                <a:solidFill>
+                  <a:srgbClr val="F3F3F3"/>
+                </a:solidFill>
+                <a:latin typeface="Arial"/>
+                <a:ea typeface="Arial"/>
+                <a:cs typeface="Arial"/>
+                <a:sym typeface="Arial"/>
+              </a:defRPr>
+            </a:lvl2pPr>
+            <a:lvl3pPr marR="0" lvl="2" algn="ctr" rtl="0">
+              <a:lnSpc>
+                <a:spcPct val="100000"/>
+              </a:lnSpc>
+              <a:spcBef>
+                <a:spcPts val="0"/>
+              </a:spcBef>
+              <a:spcAft>
+                <a:spcPts val="0"/>
+              </a:spcAft>
+              <a:buClr>
+                <a:srgbClr val="F3F3F3"/>
+              </a:buClr>
+              <a:buSzPts val="5200"/>
+              <a:buFont typeface="Arial"/>
+              <a:buNone/>
+              <a:defRPr sz="5200" b="0" i="0" u="none" strike="noStrike" cap="none">
+                <a:solidFill>
+                  <a:srgbClr val="F3F3F3"/>
+                </a:solidFill>
+                <a:latin typeface="Arial"/>
+                <a:ea typeface="Arial"/>
+                <a:cs typeface="Arial"/>
+                <a:sym typeface="Arial"/>
+              </a:defRPr>
+            </a:lvl3pPr>
+            <a:lvl4pPr marR="0" lvl="3" algn="ctr" rtl="0">
+              <a:lnSpc>
+                <a:spcPct val="100000"/>
+              </a:lnSpc>
+              <a:spcBef>
+                <a:spcPts val="0"/>
+              </a:spcBef>
+              <a:spcAft>
+                <a:spcPts val="0"/>
+              </a:spcAft>
+              <a:buClr>
+                <a:srgbClr val="F3F3F3"/>
+              </a:buClr>
+              <a:buSzPts val="5200"/>
+              <a:buFont typeface="Arial"/>
+              <a:buNone/>
+              <a:defRPr sz="5200" b="0" i="0" u="none" strike="noStrike" cap="none">
+                <a:solidFill>
+                  <a:srgbClr val="F3F3F3"/>
+                </a:solidFill>
+                <a:latin typeface="Arial"/>
+                <a:ea typeface="Arial"/>
+                <a:cs typeface="Arial"/>
+                <a:sym typeface="Arial"/>
+              </a:defRPr>
+            </a:lvl4pPr>
+            <a:lvl5pPr marR="0" lvl="4" algn="ctr" rtl="0">
+              <a:lnSpc>
+                <a:spcPct val="100000"/>
+              </a:lnSpc>
+              <a:spcBef>
+                <a:spcPts val="0"/>
+              </a:spcBef>
+              <a:spcAft>
+                <a:spcPts val="0"/>
+              </a:spcAft>
+              <a:buClr>
+                <a:srgbClr val="F3F3F3"/>
+              </a:buClr>
+              <a:buSzPts val="5200"/>
+              <a:buFont typeface="Arial"/>
+              <a:buNone/>
+              <a:defRPr sz="5200" b="0" i="0" u="none" strike="noStrike" cap="none">
+                <a:solidFill>
+                  <a:srgbClr val="F3F3F3"/>
+                </a:solidFill>
+                <a:latin typeface="Arial"/>
+                <a:ea typeface="Arial"/>
+                <a:cs typeface="Arial"/>
+                <a:sym typeface="Arial"/>
+              </a:defRPr>
+            </a:lvl5pPr>
+            <a:lvl6pPr marR="0" lvl="5" algn="ctr" rtl="0">
+              <a:lnSpc>
+                <a:spcPct val="100000"/>
+              </a:lnSpc>
+              <a:spcBef>
+                <a:spcPts val="0"/>
+              </a:spcBef>
+              <a:spcAft>
+                <a:spcPts val="0"/>
+              </a:spcAft>
+              <a:buClr>
+                <a:srgbClr val="F3F3F3"/>
+              </a:buClr>
+              <a:buSzPts val="5200"/>
+              <a:buFont typeface="Arial"/>
+              <a:buNone/>
+              <a:defRPr sz="5200" b="0" i="0" u="none" strike="noStrike" cap="none">
+                <a:solidFill>
+                  <a:srgbClr val="F3F3F3"/>
+                </a:solidFill>
+                <a:latin typeface="Arial"/>
+                <a:ea typeface="Arial"/>
+                <a:cs typeface="Arial"/>
+                <a:sym typeface="Arial"/>
+              </a:defRPr>
+            </a:lvl6pPr>
+            <a:lvl7pPr marR="0" lvl="6" algn="ctr" rtl="0">
+              <a:lnSpc>
+                <a:spcPct val="100000"/>
+              </a:lnSpc>
+              <a:spcBef>
+                <a:spcPts val="0"/>
+              </a:spcBef>
+              <a:spcAft>
+                <a:spcPts val="0"/>
+              </a:spcAft>
+              <a:buClr>
+                <a:srgbClr val="F3F3F3"/>
+              </a:buClr>
+              <a:buSzPts val="5200"/>
+              <a:buFont typeface="Arial"/>
+              <a:buNone/>
+              <a:defRPr sz="5200" b="0" i="0" u="none" strike="noStrike" cap="none">
+                <a:solidFill>
+                  <a:srgbClr val="F3F3F3"/>
+                </a:solidFill>
+                <a:latin typeface="Arial"/>
+                <a:ea typeface="Arial"/>
+                <a:cs typeface="Arial"/>
+                <a:sym typeface="Arial"/>
+              </a:defRPr>
+            </a:lvl7pPr>
+            <a:lvl8pPr marR="0" lvl="7" algn="ctr" rtl="0">
+              <a:lnSpc>
+                <a:spcPct val="100000"/>
+              </a:lnSpc>
+              <a:spcBef>
+                <a:spcPts val="0"/>
+              </a:spcBef>
+              <a:spcAft>
+                <a:spcPts val="0"/>
+              </a:spcAft>
+              <a:buClr>
+                <a:srgbClr val="F3F3F3"/>
+              </a:buClr>
+              <a:buSzPts val="5200"/>
+              <a:buFont typeface="Arial"/>
+              <a:buNone/>
+              <a:defRPr sz="5200" b="0" i="0" u="none" strike="noStrike" cap="none">
+                <a:solidFill>
+                  <a:srgbClr val="F3F3F3"/>
+                </a:solidFill>
+                <a:latin typeface="Arial"/>
+                <a:ea typeface="Arial"/>
+                <a:cs typeface="Arial"/>
+                <a:sym typeface="Arial"/>
+              </a:defRPr>
+            </a:lvl8pPr>
+            <a:lvl9pPr marR="0" lvl="8" algn="ctr" rtl="0">
+              <a:lnSpc>
+                <a:spcPct val="100000"/>
+              </a:lnSpc>
+              <a:spcBef>
+                <a:spcPts val="0"/>
+              </a:spcBef>
+              <a:spcAft>
+                <a:spcPts val="0"/>
+              </a:spcAft>
+              <a:buClr>
+                <a:srgbClr val="F3F3F3"/>
+              </a:buClr>
+              <a:buSzPts val="5200"/>
+              <a:buFont typeface="Arial"/>
+              <a:buNone/>
+              <a:defRPr sz="5200" b="0" i="0" u="none" strike="noStrike" cap="none">
+                <a:solidFill>
+                  <a:srgbClr val="F3F3F3"/>
+                </a:solidFill>
+                <a:latin typeface="Arial"/>
+                <a:ea typeface="Arial"/>
+                <a:cs typeface="Arial"/>
+                <a:sym typeface="Arial"/>
+              </a:defRPr>
+            </a:lvl9pPr>
+          </a:lstStyle>
+          <a:p>
+            <a:r>
+              <a:rPr lang="pt-BR" sz="3200" dirty="0" smtClean="0"/>
+              <a:t>TESTES DE CARGA</a:t>
             </a:r>
-            <a:endParaRPr sz="4400" dirty="0">
-              <a:latin typeface="Josefin Sans"/>
-              <a:ea typeface="Josefin Sans"/>
-              <a:cs typeface="Josefin Sans"/>
-              <a:sym typeface="Josefin Sans"/>
-            </a:endParaRPr>
+            <a:endParaRPr lang="pt-BR" sz="3200" dirty="0"/>
           </a:p>
         </p:txBody>
       </p:sp>
-      <p:cxnSp>
-        <p:nvCxnSpPr>
-          <p:cNvPr id="327" name="Google Shape;327;p20"/>
-          <p:cNvCxnSpPr/>
-          <p:nvPr/>
-        </p:nvCxnSpPr>
-        <p:spPr>
-          <a:xfrm>
-            <a:off x="841434" y="2762125"/>
-            <a:ext cx="373800" cy="0"/>
-          </a:xfrm>
-          <a:prstGeom prst="straightConnector1">
-            <a:avLst/>
-          </a:prstGeom>
-          <a:noFill/>
-          <a:ln w="19050" cap="flat" cmpd="sng">
-            <a:solidFill>
-              <a:srgbClr val="F3F3F3"/>
-            </a:solidFill>
-            <a:prstDash val="solid"/>
-            <a:round/>
-            <a:headEnd type="none" w="med" len="med"/>
-            <a:tailEnd type="none" w="med" len="med"/>
-          </a:ln>
-        </p:spPr>
-      </p:cxnSp>
       <p:pic>
         <p:nvPicPr>
-          <p:cNvPr id="14" name="Imagem 13">
+          <p:cNvPr id="8" name="Imagem 7">
             <a:extLst>
               <a:ext uri="{FF2B5EF4-FFF2-40B4-BE49-F238E27FC236}">
-                <a16:creationId xmlns:a16="http://schemas.microsoft.com/office/drawing/2014/main" xmlns="" id="{A1546BA2-A746-4D78-BA2A-66EACE53308E}"/>
+                <a16:creationId xmlns="" xmlns:a16="http://schemas.microsoft.com/office/drawing/2014/main" id="{A1546BA2-A746-4D78-BA2A-66EACE53308E}"/>
               </a:ext>
             </a:extLst>
           </p:cNvPr>
@@ -22279,18 +22172,484 @@
         </p:blipFill>
         <p:spPr>
           <a:xfrm>
-            <a:off x="6411514" y="1407885"/>
-            <a:ext cx="2133920" cy="2133920"/>
+            <a:off x="196483" y="175701"/>
+            <a:ext cx="533852" cy="533852"/>
           </a:xfrm>
           <a:prstGeom prst="rect">
             <a:avLst/>
           </a:prstGeom>
         </p:spPr>
       </p:pic>
+      <p:sp>
+        <p:nvSpPr>
+          <p:cNvPr id="9" name="Google Shape;325;p20"/>
+          <p:cNvSpPr txBox="1">
+            <a:spLocks noGrp="1"/>
+          </p:cNvSpPr>
+          <p:nvPr>
+            <p:ph type="ctrTitle"/>
+          </p:nvPr>
+        </p:nvSpPr>
+        <p:spPr>
+          <a:xfrm>
+            <a:off x="304721" y="1752600"/>
+            <a:ext cx="3973365" cy="3188163"/>
+          </a:xfrm>
+          <a:prstGeom prst="rect">
+            <a:avLst/>
+          </a:prstGeom>
+        </p:spPr>
+        <p:txBody>
+          <a:bodyPr spcFirstLastPara="1" wrap="square" lIns="91425" tIns="91425" rIns="91425" bIns="91425" anchor="t" anchorCtr="0">
+            <a:noAutofit/>
+          </a:bodyPr>
+          <a:lstStyle/>
+          <a:p>
+            <a:pPr lvl="0"/>
+            <a:r>
+              <a:rPr lang="pt-BR" sz="2800" dirty="0" smtClean="0"/>
+              <a:t>POR QUE UTILIZAR?</a:t>
+            </a:r>
+            <a:br>
+              <a:rPr lang="pt-BR" sz="2800" dirty="0" smtClean="0"/>
+            </a:br>
+            <a:r>
+              <a:rPr lang="pt-BR" sz="2800" dirty="0" smtClean="0"/>
+              <a:t/>
+            </a:r>
+            <a:br>
+              <a:rPr lang="pt-BR" sz="2800" dirty="0" smtClean="0"/>
+            </a:br>
+            <a:r>
+              <a:rPr lang="pt-BR" sz="2200" dirty="0" smtClean="0"/>
+              <a:t>- Qualidade de software</a:t>
+            </a:r>
+            <a:r>
+              <a:rPr lang="pt-BR" sz="2200" dirty="0"/>
+              <a:t/>
+            </a:r>
+            <a:br>
+              <a:rPr lang="pt-BR" sz="2200" dirty="0"/>
+            </a:br>
+            <a:r>
+              <a:rPr lang="pt-BR" sz="2200" dirty="0"/>
+              <a:t>- </a:t>
+            </a:r>
+            <a:r>
+              <a:rPr lang="pt-BR" sz="2200" dirty="0" smtClean="0"/>
+              <a:t>Picos de usuários no sistema</a:t>
+            </a:r>
+            <a:r>
+              <a:rPr lang="pt-BR" sz="2200" dirty="0"/>
+              <a:t/>
+            </a:r>
+            <a:br>
+              <a:rPr lang="pt-BR" sz="2200" dirty="0"/>
+            </a:br>
+            <a:r>
+              <a:rPr lang="pt-BR" sz="2200" dirty="0"/>
+              <a:t>- </a:t>
+            </a:r>
+            <a:r>
+              <a:rPr lang="pt-BR" sz="2200" dirty="0" smtClean="0"/>
+              <a:t>Avaliar resultados de acordo com o esperado</a:t>
+            </a:r>
+            <a:r>
+              <a:rPr lang="pt-BR" sz="2200" dirty="0"/>
+              <a:t/>
+            </a:r>
+            <a:br>
+              <a:rPr lang="pt-BR" sz="2200" dirty="0"/>
+            </a:br>
+            <a:r>
+              <a:rPr lang="pt-BR" sz="2200" dirty="0"/>
+              <a:t>- </a:t>
+            </a:r>
+            <a:r>
+              <a:rPr lang="pt-BR" sz="2200" dirty="0" smtClean="0"/>
+              <a:t>Ferramenta gratuita e open </a:t>
+            </a:r>
+            <a:r>
+              <a:rPr lang="pt-BR" sz="2200" dirty="0" err="1" smtClean="0"/>
+              <a:t>source</a:t>
+            </a:r>
+            <a:endParaRPr sz="2200" dirty="0">
+              <a:sym typeface="Josefin Sans"/>
+            </a:endParaRPr>
+          </a:p>
+        </p:txBody>
+      </p:sp>
+      <p:cxnSp>
+        <p:nvCxnSpPr>
+          <p:cNvPr id="10" name="Google Shape;327;p20"/>
+          <p:cNvCxnSpPr/>
+          <p:nvPr/>
+        </p:nvCxnSpPr>
+        <p:spPr>
+          <a:xfrm flipH="1">
+            <a:off x="4616310" y="2351314"/>
+            <a:ext cx="3966" cy="2373086"/>
+          </a:xfrm>
+          <a:prstGeom prst="straightConnector1">
+            <a:avLst/>
+          </a:prstGeom>
+          <a:noFill/>
+          <a:ln w="19050" cap="flat" cmpd="sng">
+            <a:solidFill>
+              <a:srgbClr val="F3F3F3"/>
+            </a:solidFill>
+            <a:prstDash val="solid"/>
+            <a:round/>
+            <a:headEnd type="none" w="med" len="med"/>
+            <a:tailEnd type="none" w="med" len="med"/>
+          </a:ln>
+        </p:spPr>
+      </p:cxnSp>
+      <p:sp>
+        <p:nvSpPr>
+          <p:cNvPr id="11" name="Google Shape;325;p20"/>
+          <p:cNvSpPr txBox="1">
+            <a:spLocks/>
+          </p:cNvSpPr>
+          <p:nvPr/>
+        </p:nvSpPr>
+        <p:spPr>
+          <a:xfrm>
+            <a:off x="4966432" y="1752599"/>
+            <a:ext cx="3973365" cy="3188163"/>
+          </a:xfrm>
+          <a:prstGeom prst="rect">
+            <a:avLst/>
+          </a:prstGeom>
+          <a:noFill/>
+          <a:ln>
+            <a:noFill/>
+          </a:ln>
+        </p:spPr>
+        <p:txBody>
+          <a:bodyPr spcFirstLastPara="1" wrap="square" lIns="91425" tIns="91425" rIns="91425" bIns="91425" anchor="t" anchorCtr="0">
+            <a:noAutofit/>
+          </a:bodyPr>
+          <a:lstStyle>
+            <a:defPPr marR="0" lvl="0" algn="l" rtl="0">
+              <a:lnSpc>
+                <a:spcPct val="100000"/>
+              </a:lnSpc>
+              <a:spcBef>
+                <a:spcPts val="0"/>
+              </a:spcBef>
+              <a:spcAft>
+                <a:spcPts val="0"/>
+              </a:spcAft>
+            </a:defPPr>
+            <a:lvl1pPr marR="0" lvl="0" algn="l" rtl="0">
+              <a:lnSpc>
+                <a:spcPct val="100000"/>
+              </a:lnSpc>
+              <a:spcBef>
+                <a:spcPts val="0"/>
+              </a:spcBef>
+              <a:spcAft>
+                <a:spcPts val="0"/>
+              </a:spcAft>
+              <a:buClr>
+                <a:srgbClr val="F3F3F3"/>
+              </a:buClr>
+              <a:buSzPts val="6000"/>
+              <a:buFont typeface="Josefin Sans"/>
+              <a:buNone/>
+              <a:defRPr sz="5400" b="0" i="0" u="none" strike="noStrike" cap="none">
+                <a:solidFill>
+                  <a:srgbClr val="F3F3F3"/>
+                </a:solidFill>
+                <a:latin typeface="Josefin Sans"/>
+                <a:ea typeface="Josefin Sans"/>
+                <a:cs typeface="Josefin Sans"/>
+                <a:sym typeface="Josefin Sans"/>
+              </a:defRPr>
+            </a:lvl1pPr>
+            <a:lvl2pPr marR="0" lvl="1" algn="ctr" rtl="0">
+              <a:lnSpc>
+                <a:spcPct val="100000"/>
+              </a:lnSpc>
+              <a:spcBef>
+                <a:spcPts val="0"/>
+              </a:spcBef>
+              <a:spcAft>
+                <a:spcPts val="0"/>
+              </a:spcAft>
+              <a:buClr>
+                <a:srgbClr val="F3F3F3"/>
+              </a:buClr>
+              <a:buSzPts val="5200"/>
+              <a:buFont typeface="Arial"/>
+              <a:buNone/>
+              <a:defRPr sz="5200" b="0" i="0" u="none" strike="noStrike" cap="none">
+                <a:solidFill>
+                  <a:srgbClr val="F3F3F3"/>
+                </a:solidFill>
+                <a:latin typeface="Arial"/>
+                <a:ea typeface="Arial"/>
+                <a:cs typeface="Arial"/>
+                <a:sym typeface="Arial"/>
+              </a:defRPr>
+            </a:lvl2pPr>
+            <a:lvl3pPr marR="0" lvl="2" algn="ctr" rtl="0">
+              <a:lnSpc>
+                <a:spcPct val="100000"/>
+              </a:lnSpc>
+              <a:spcBef>
+                <a:spcPts val="0"/>
+              </a:spcBef>
+              <a:spcAft>
+                <a:spcPts val="0"/>
+              </a:spcAft>
+              <a:buClr>
+                <a:srgbClr val="F3F3F3"/>
+              </a:buClr>
+              <a:buSzPts val="5200"/>
+              <a:buFont typeface="Arial"/>
+              <a:buNone/>
+              <a:defRPr sz="5200" b="0" i="0" u="none" strike="noStrike" cap="none">
+                <a:solidFill>
+                  <a:srgbClr val="F3F3F3"/>
+                </a:solidFill>
+                <a:latin typeface="Arial"/>
+                <a:ea typeface="Arial"/>
+                <a:cs typeface="Arial"/>
+                <a:sym typeface="Arial"/>
+              </a:defRPr>
+            </a:lvl3pPr>
+            <a:lvl4pPr marR="0" lvl="3" algn="ctr" rtl="0">
+              <a:lnSpc>
+                <a:spcPct val="100000"/>
+              </a:lnSpc>
+              <a:spcBef>
+                <a:spcPts val="0"/>
+              </a:spcBef>
+              <a:spcAft>
+                <a:spcPts val="0"/>
+              </a:spcAft>
+              <a:buClr>
+                <a:srgbClr val="F3F3F3"/>
+              </a:buClr>
+              <a:buSzPts val="5200"/>
+              <a:buFont typeface="Arial"/>
+              <a:buNone/>
+              <a:defRPr sz="5200" b="0" i="0" u="none" strike="noStrike" cap="none">
+                <a:solidFill>
+                  <a:srgbClr val="F3F3F3"/>
+                </a:solidFill>
+                <a:latin typeface="Arial"/>
+                <a:ea typeface="Arial"/>
+                <a:cs typeface="Arial"/>
+                <a:sym typeface="Arial"/>
+              </a:defRPr>
+            </a:lvl4pPr>
+            <a:lvl5pPr marR="0" lvl="4" algn="ctr" rtl="0">
+              <a:lnSpc>
+                <a:spcPct val="100000"/>
+              </a:lnSpc>
+              <a:spcBef>
+                <a:spcPts val="0"/>
+              </a:spcBef>
+              <a:spcAft>
+                <a:spcPts val="0"/>
+              </a:spcAft>
+              <a:buClr>
+                <a:srgbClr val="F3F3F3"/>
+              </a:buClr>
+              <a:buSzPts val="5200"/>
+              <a:buFont typeface="Arial"/>
+              <a:buNone/>
+              <a:defRPr sz="5200" b="0" i="0" u="none" strike="noStrike" cap="none">
+                <a:solidFill>
+                  <a:srgbClr val="F3F3F3"/>
+                </a:solidFill>
+                <a:latin typeface="Arial"/>
+                <a:ea typeface="Arial"/>
+                <a:cs typeface="Arial"/>
+                <a:sym typeface="Arial"/>
+              </a:defRPr>
+            </a:lvl5pPr>
+            <a:lvl6pPr marR="0" lvl="5" algn="ctr" rtl="0">
+              <a:lnSpc>
+                <a:spcPct val="100000"/>
+              </a:lnSpc>
+              <a:spcBef>
+                <a:spcPts val="0"/>
+              </a:spcBef>
+              <a:spcAft>
+                <a:spcPts val="0"/>
+              </a:spcAft>
+              <a:buClr>
+                <a:srgbClr val="F3F3F3"/>
+              </a:buClr>
+              <a:buSzPts val="5200"/>
+              <a:buFont typeface="Arial"/>
+              <a:buNone/>
+              <a:defRPr sz="5200" b="0" i="0" u="none" strike="noStrike" cap="none">
+                <a:solidFill>
+                  <a:srgbClr val="F3F3F3"/>
+                </a:solidFill>
+                <a:latin typeface="Arial"/>
+                <a:ea typeface="Arial"/>
+                <a:cs typeface="Arial"/>
+                <a:sym typeface="Arial"/>
+              </a:defRPr>
+            </a:lvl6pPr>
+            <a:lvl7pPr marR="0" lvl="6" algn="ctr" rtl="0">
+              <a:lnSpc>
+                <a:spcPct val="100000"/>
+              </a:lnSpc>
+              <a:spcBef>
+                <a:spcPts val="0"/>
+              </a:spcBef>
+              <a:spcAft>
+                <a:spcPts val="0"/>
+              </a:spcAft>
+              <a:buClr>
+                <a:srgbClr val="F3F3F3"/>
+              </a:buClr>
+              <a:buSzPts val="5200"/>
+              <a:buFont typeface="Arial"/>
+              <a:buNone/>
+              <a:defRPr sz="5200" b="0" i="0" u="none" strike="noStrike" cap="none">
+                <a:solidFill>
+                  <a:srgbClr val="F3F3F3"/>
+                </a:solidFill>
+                <a:latin typeface="Arial"/>
+                <a:ea typeface="Arial"/>
+                <a:cs typeface="Arial"/>
+                <a:sym typeface="Arial"/>
+              </a:defRPr>
+            </a:lvl7pPr>
+            <a:lvl8pPr marR="0" lvl="7" algn="ctr" rtl="0">
+              <a:lnSpc>
+                <a:spcPct val="100000"/>
+              </a:lnSpc>
+              <a:spcBef>
+                <a:spcPts val="0"/>
+              </a:spcBef>
+              <a:spcAft>
+                <a:spcPts val="0"/>
+              </a:spcAft>
+              <a:buClr>
+                <a:srgbClr val="F3F3F3"/>
+              </a:buClr>
+              <a:buSzPts val="5200"/>
+              <a:buFont typeface="Arial"/>
+              <a:buNone/>
+              <a:defRPr sz="5200" b="0" i="0" u="none" strike="noStrike" cap="none">
+                <a:solidFill>
+                  <a:srgbClr val="F3F3F3"/>
+                </a:solidFill>
+                <a:latin typeface="Arial"/>
+                <a:ea typeface="Arial"/>
+                <a:cs typeface="Arial"/>
+                <a:sym typeface="Arial"/>
+              </a:defRPr>
+            </a:lvl8pPr>
+            <a:lvl9pPr marR="0" lvl="8" algn="ctr" rtl="0">
+              <a:lnSpc>
+                <a:spcPct val="100000"/>
+              </a:lnSpc>
+              <a:spcBef>
+                <a:spcPts val="0"/>
+              </a:spcBef>
+              <a:spcAft>
+                <a:spcPts val="0"/>
+              </a:spcAft>
+              <a:buClr>
+                <a:srgbClr val="F3F3F3"/>
+              </a:buClr>
+              <a:buSzPts val="5200"/>
+              <a:buFont typeface="Arial"/>
+              <a:buNone/>
+              <a:defRPr sz="5200" b="0" i="0" u="none" strike="noStrike" cap="none">
+                <a:solidFill>
+                  <a:srgbClr val="F3F3F3"/>
+                </a:solidFill>
+                <a:latin typeface="Arial"/>
+                <a:ea typeface="Arial"/>
+                <a:cs typeface="Arial"/>
+                <a:sym typeface="Arial"/>
+              </a:defRPr>
+            </a:lvl9pPr>
+          </a:lstStyle>
+          <a:p>
+            <a:r>
+              <a:rPr lang="pt-BR" sz="2800" dirty="0" smtClean="0"/>
+              <a:t>ONDE ATUA?</a:t>
+            </a:r>
+          </a:p>
+          <a:p>
+            <a:r>
+              <a:rPr lang="pt-BR" sz="2800" dirty="0" smtClean="0"/>
+              <a:t/>
+            </a:r>
+            <a:br>
+              <a:rPr lang="pt-BR" sz="2800" dirty="0" smtClean="0"/>
+            </a:br>
+            <a:r>
+              <a:rPr lang="pt-BR" sz="2800" dirty="0" smtClean="0"/>
+              <a:t>- Nos pontos de vendas</a:t>
+            </a:r>
+          </a:p>
+          <a:p>
+            <a:r>
+              <a:rPr lang="pt-BR" sz="2800" dirty="0" smtClean="0"/>
+              <a:t>- Levantamento de dados das compras dos clientes</a:t>
+            </a:r>
+          </a:p>
+          <a:p>
+            <a:r>
+              <a:rPr lang="pt-BR" sz="2800" dirty="0" smtClean="0"/>
+              <a:t>- Limites de sistema</a:t>
+            </a:r>
+          </a:p>
+          <a:p>
+            <a:endParaRPr lang="pt-BR" sz="2800" dirty="0" smtClean="0"/>
+          </a:p>
+        </p:txBody>
+      </p:sp>
+      <p:pic>
+        <p:nvPicPr>
+          <p:cNvPr id="2" name="Imagem 1"/>
+          <p:cNvPicPr>
+            <a:picLocks noChangeAspect="1"/>
+          </p:cNvPicPr>
+          <p:nvPr/>
+        </p:nvPicPr>
+        <p:blipFill>
+          <a:blip r:embed="rId4">
+            <a:extLst>
+              <a:ext uri="{28A0092B-C50C-407E-A947-70E740481C1C}">
+                <a14:useLocalDpi xmlns:a14="http://schemas.microsoft.com/office/drawing/2010/main" val="0"/>
+              </a:ext>
+            </a:extLst>
+          </a:blip>
+          <a:stretch>
+            <a:fillRect/>
+          </a:stretch>
+        </p:blipFill>
+        <p:spPr>
+          <a:xfrm>
+            <a:off x="3430524" y="875392"/>
+            <a:ext cx="2371572" cy="805697"/>
+          </a:xfrm>
+          <a:prstGeom prst="rect">
+            <a:avLst/>
+          </a:prstGeom>
+          <a:solidFill>
+            <a:srgbClr val="303030"/>
+          </a:solidFill>
+        </p:spPr>
+      </p:pic>
     </p:spTree>
     <p:extLst>
       <p:ext uri="{BB962C8B-B14F-4D97-AF65-F5344CB8AC3E}">
-        <p14:creationId xmlns:p14="http://schemas.microsoft.com/office/powerpoint/2010/main" val="2962887431"/>
+        <p14:creationId xmlns:p14="http://schemas.microsoft.com/office/powerpoint/2010/main" val="2005515087"/>
       </p:ext>
     </p:extLst>
   </p:cSld>
@@ -22512,30 +22871,13 @@
               <a:buNone/>
             </a:pPr>
             <a:r>
-              <a:rPr lang="pt-BR" sz="4400" dirty="0" smtClean="0">
+              <a:rPr lang="pt-BR" dirty="0" smtClean="0">
                 <a:latin typeface="Josefin Sans"/>
                 <a:ea typeface="Josefin Sans"/>
                 <a:cs typeface="Josefin Sans"/>
                 <a:sym typeface="Josefin Sans"/>
               </a:rPr>
-              <a:t>DIAGRAMA DE </a:t>
-            </a:r>
-            <a:br>
-              <a:rPr lang="pt-BR" sz="4400" dirty="0" smtClean="0">
-                <a:latin typeface="Josefin Sans"/>
-                <a:ea typeface="Josefin Sans"/>
-                <a:cs typeface="Josefin Sans"/>
-                <a:sym typeface="Josefin Sans"/>
-              </a:rPr>
-            </a:br>
-            <a:r>
-              <a:rPr lang="pt-BR" sz="4400" dirty="0" smtClean="0">
-                <a:latin typeface="Josefin Sans"/>
-                <a:ea typeface="Josefin Sans"/>
-                <a:cs typeface="Josefin Sans"/>
-                <a:sym typeface="Josefin Sans"/>
-              </a:rPr>
-              <a:t>CLASSES</a:t>
+              <a:t>STORYBOARD</a:t>
             </a:r>
             <a:endParaRPr sz="4400" dirty="0">
               <a:latin typeface="Josefin Sans"/>
@@ -22577,7 +22919,7 @@
           <p:cNvPr id="14" name="Imagem 13">
             <a:extLst>
               <a:ext uri="{FF2B5EF4-FFF2-40B4-BE49-F238E27FC236}">
-                <a16:creationId xmlns:a16="http://schemas.microsoft.com/office/drawing/2014/main" xmlns="" id="{A1546BA2-A746-4D78-BA2A-66EACE53308E}"/>
+                <a16:creationId xmlns="" xmlns:a16="http://schemas.microsoft.com/office/drawing/2014/main" id="{A1546BA2-A746-4D78-BA2A-66EACE53308E}"/>
               </a:ext>
             </a:extLst>
           </p:cNvPr>
@@ -22611,7 +22953,7 @@
     </p:spTree>
     <p:extLst>
       <p:ext uri="{BB962C8B-B14F-4D97-AF65-F5344CB8AC3E}">
-        <p14:creationId xmlns:p14="http://schemas.microsoft.com/office/powerpoint/2010/main" val="649081597"/>
+        <p14:creationId xmlns:p14="http://schemas.microsoft.com/office/powerpoint/2010/main" val="2962887431"/>
       </p:ext>
     </p:extLst>
   </p:cSld>
@@ -22810,81 +23152,53 @@
         </p:nvSpPr>
         <p:spPr>
           <a:xfrm>
-            <a:off x="304721" y="1045030"/>
-            <a:ext cx="8635076" cy="4005942"/>
+            <a:off x="720000" y="804075"/>
+            <a:ext cx="7704000" cy="1989000"/>
           </a:xfrm>
           <a:prstGeom prst="rect">
             <a:avLst/>
           </a:prstGeom>
         </p:spPr>
         <p:txBody>
-          <a:bodyPr spcFirstLastPara="1" wrap="square" lIns="91425" tIns="91425" rIns="91425" bIns="91425" anchor="t" anchorCtr="0">
+          <a:bodyPr spcFirstLastPara="1" wrap="square" lIns="91425" tIns="91425" rIns="91425" bIns="91425" anchor="b" anchorCtr="0">
             <a:noAutofit/>
           </a:bodyPr>
           <a:lstStyle/>
           <a:p>
-            <a:pPr algn="ctr"/>
+            <a:pPr marL="0" lvl="0" indent="0" algn="l" rtl="0">
+              <a:spcBef>
+                <a:spcPts val="0"/>
+              </a:spcBef>
+              <a:spcAft>
+                <a:spcPts val="0"/>
+              </a:spcAft>
+              <a:buNone/>
+            </a:pPr>
             <a:r>
-              <a:rPr lang="pt-BR" sz="2800" dirty="0" smtClean="0"/>
-              <a:t>WINDOWS – LINUX UBUNTU (Virtual </a:t>
-            </a:r>
-            <a:r>
-              <a:rPr lang="pt-BR" sz="2800" dirty="0" err="1" smtClean="0"/>
-              <a:t>Machine</a:t>
-            </a:r>
-            <a:r>
-              <a:rPr lang="pt-BR" sz="2800" dirty="0" smtClean="0"/>
-              <a:t>)</a:t>
-            </a:r>
-            <a:r>
-              <a:rPr lang="pt-BR" sz="2800" dirty="0"/>
-              <a:t/>
+              <a:rPr lang="pt-BR" sz="4400" dirty="0" smtClean="0">
+                <a:latin typeface="Josefin Sans"/>
+                <a:ea typeface="Josefin Sans"/>
+                <a:cs typeface="Josefin Sans"/>
+                <a:sym typeface="Josefin Sans"/>
+              </a:rPr>
+              <a:t>DIAGRAMA DE </a:t>
             </a:r>
             <a:br>
-              <a:rPr lang="pt-BR" sz="2800" dirty="0"/>
+              <a:rPr lang="pt-BR" sz="4400" dirty="0" smtClean="0">
+                <a:latin typeface="Josefin Sans"/>
+                <a:ea typeface="Josefin Sans"/>
+                <a:cs typeface="Josefin Sans"/>
+                <a:sym typeface="Josefin Sans"/>
+              </a:rPr>
             </a:br>
             <a:r>
-              <a:rPr lang="pt-BR" sz="2800" dirty="0" smtClean="0"/>
-              <a:t/>
-            </a:r>
-            <a:br>
-              <a:rPr lang="pt-BR" sz="2800" dirty="0" smtClean="0"/>
-            </a:br>
-            <a:r>
-              <a:rPr lang="pt-BR" sz="2800" dirty="0" smtClean="0"/>
-              <a:t/>
-            </a:r>
-            <a:br>
-              <a:rPr lang="pt-BR" sz="2800" dirty="0" smtClean="0"/>
-            </a:br>
-            <a:r>
-              <a:rPr lang="pt-BR" sz="2800" dirty="0" smtClean="0"/>
-              <a:t>- </a:t>
-            </a:r>
-            <a:r>
-              <a:rPr lang="pt-BR" sz="2800" dirty="0"/>
-              <a:t>OSHI</a:t>
-            </a:r>
-            <a:br>
-              <a:rPr lang="pt-BR" sz="2800" dirty="0"/>
-            </a:br>
-            <a:r>
-              <a:rPr lang="pt-BR" sz="2800" dirty="0"/>
-              <a:t>- Script de Instalação </a:t>
-            </a:r>
-            <a:br>
-              <a:rPr lang="pt-BR" sz="2800" dirty="0"/>
-            </a:br>
-            <a:r>
-              <a:rPr lang="pt-BR" sz="2800" dirty="0"/>
-              <a:t>- JAR Executável</a:t>
-            </a:r>
-            <a:br>
-              <a:rPr lang="pt-BR" sz="2800" dirty="0"/>
-            </a:br>
-            <a:r>
-              <a:rPr lang="pt-BR" sz="2800" dirty="0"/>
-              <a:t>- Alertas</a:t>
+              <a:rPr lang="pt-BR" sz="4400" dirty="0" smtClean="0">
+                <a:latin typeface="Josefin Sans"/>
+                <a:ea typeface="Josefin Sans"/>
+                <a:cs typeface="Josefin Sans"/>
+                <a:sym typeface="Josefin Sans"/>
+              </a:rPr>
+              <a:t>CLASSES</a:t>
             </a:r>
             <a:endParaRPr sz="4400" dirty="0">
               <a:latin typeface="Josefin Sans"/>
@@ -22895,293 +23209,38 @@
           </a:p>
         </p:txBody>
       </p:sp>
-      <p:sp>
-        <p:nvSpPr>
-          <p:cNvPr id="6" name="Google Shape;325;p20"/>
-          <p:cNvSpPr txBox="1">
-            <a:spLocks/>
-          </p:cNvSpPr>
+      <p:cxnSp>
+        <p:nvCxnSpPr>
+          <p:cNvPr id="327" name="Google Shape;327;p20"/>
+          <p:cNvCxnSpPr/>
           <p:nvPr/>
-        </p:nvSpPr>
+        </p:nvCxnSpPr>
         <p:spPr>
           <a:xfrm>
-            <a:off x="1061779" y="175701"/>
-            <a:ext cx="4555250" cy="699691"/>
+            <a:off x="841434" y="2762125"/>
+            <a:ext cx="373800" cy="0"/>
           </a:xfrm>
-          <a:prstGeom prst="rect">
+          <a:prstGeom prst="straightConnector1">
             <a:avLst/>
           </a:prstGeom>
           <a:noFill/>
-          <a:ln>
-            <a:noFill/>
+          <a:ln w="19050" cap="flat" cmpd="sng">
+            <a:solidFill>
+              <a:srgbClr val="F3F3F3"/>
+            </a:solidFill>
+            <a:prstDash val="solid"/>
+            <a:round/>
+            <a:headEnd type="none" w="med" len="med"/>
+            <a:tailEnd type="none" w="med" len="med"/>
           </a:ln>
         </p:spPr>
-        <p:txBody>
-          <a:bodyPr spcFirstLastPara="1" wrap="square" lIns="91425" tIns="91425" rIns="91425" bIns="91425" anchor="b" anchorCtr="0">
-            <a:noAutofit/>
-          </a:bodyPr>
-          <a:lstStyle>
-            <a:defPPr marR="0" lvl="0" algn="l" rtl="0">
-              <a:lnSpc>
-                <a:spcPct val="100000"/>
-              </a:lnSpc>
-              <a:spcBef>
-                <a:spcPts val="0"/>
-              </a:spcBef>
-              <a:spcAft>
-                <a:spcPts val="0"/>
-              </a:spcAft>
-            </a:defPPr>
-            <a:lvl1pPr marR="0" lvl="0" algn="l" rtl="0">
-              <a:lnSpc>
-                <a:spcPct val="100000"/>
-              </a:lnSpc>
-              <a:spcBef>
-                <a:spcPts val="0"/>
-              </a:spcBef>
-              <a:spcAft>
-                <a:spcPts val="0"/>
-              </a:spcAft>
-              <a:buClr>
-                <a:srgbClr val="F3F3F3"/>
-              </a:buClr>
-              <a:buSzPts val="6000"/>
-              <a:buFont typeface="Josefin Sans"/>
-              <a:buNone/>
-              <a:defRPr sz="5400" b="0" i="0" u="none" strike="noStrike" cap="none">
-                <a:solidFill>
-                  <a:srgbClr val="F3F3F3"/>
-                </a:solidFill>
-                <a:latin typeface="Josefin Sans"/>
-                <a:ea typeface="Josefin Sans"/>
-                <a:cs typeface="Josefin Sans"/>
-                <a:sym typeface="Josefin Sans"/>
-              </a:defRPr>
-            </a:lvl1pPr>
-            <a:lvl2pPr marR="0" lvl="1" algn="ctr" rtl="0">
-              <a:lnSpc>
-                <a:spcPct val="100000"/>
-              </a:lnSpc>
-              <a:spcBef>
-                <a:spcPts val="0"/>
-              </a:spcBef>
-              <a:spcAft>
-                <a:spcPts val="0"/>
-              </a:spcAft>
-              <a:buClr>
-                <a:srgbClr val="F3F3F3"/>
-              </a:buClr>
-              <a:buSzPts val="5200"/>
-              <a:buFont typeface="Arial"/>
-              <a:buNone/>
-              <a:defRPr sz="5200" b="0" i="0" u="none" strike="noStrike" cap="none">
-                <a:solidFill>
-                  <a:srgbClr val="F3F3F3"/>
-                </a:solidFill>
-                <a:latin typeface="Arial"/>
-                <a:ea typeface="Arial"/>
-                <a:cs typeface="Arial"/>
-                <a:sym typeface="Arial"/>
-              </a:defRPr>
-            </a:lvl2pPr>
-            <a:lvl3pPr marR="0" lvl="2" algn="ctr" rtl="0">
-              <a:lnSpc>
-                <a:spcPct val="100000"/>
-              </a:lnSpc>
-              <a:spcBef>
-                <a:spcPts val="0"/>
-              </a:spcBef>
-              <a:spcAft>
-                <a:spcPts val="0"/>
-              </a:spcAft>
-              <a:buClr>
-                <a:srgbClr val="F3F3F3"/>
-              </a:buClr>
-              <a:buSzPts val="5200"/>
-              <a:buFont typeface="Arial"/>
-              <a:buNone/>
-              <a:defRPr sz="5200" b="0" i="0" u="none" strike="noStrike" cap="none">
-                <a:solidFill>
-                  <a:srgbClr val="F3F3F3"/>
-                </a:solidFill>
-                <a:latin typeface="Arial"/>
-                <a:ea typeface="Arial"/>
-                <a:cs typeface="Arial"/>
-                <a:sym typeface="Arial"/>
-              </a:defRPr>
-            </a:lvl3pPr>
-            <a:lvl4pPr marR="0" lvl="3" algn="ctr" rtl="0">
-              <a:lnSpc>
-                <a:spcPct val="100000"/>
-              </a:lnSpc>
-              <a:spcBef>
-                <a:spcPts val="0"/>
-              </a:spcBef>
-              <a:spcAft>
-                <a:spcPts val="0"/>
-              </a:spcAft>
-              <a:buClr>
-                <a:srgbClr val="F3F3F3"/>
-              </a:buClr>
-              <a:buSzPts val="5200"/>
-              <a:buFont typeface="Arial"/>
-              <a:buNone/>
-              <a:defRPr sz="5200" b="0" i="0" u="none" strike="noStrike" cap="none">
-                <a:solidFill>
-                  <a:srgbClr val="F3F3F3"/>
-                </a:solidFill>
-                <a:latin typeface="Arial"/>
-                <a:ea typeface="Arial"/>
-                <a:cs typeface="Arial"/>
-                <a:sym typeface="Arial"/>
-              </a:defRPr>
-            </a:lvl4pPr>
-            <a:lvl5pPr marR="0" lvl="4" algn="ctr" rtl="0">
-              <a:lnSpc>
-                <a:spcPct val="100000"/>
-              </a:lnSpc>
-              <a:spcBef>
-                <a:spcPts val="0"/>
-              </a:spcBef>
-              <a:spcAft>
-                <a:spcPts val="0"/>
-              </a:spcAft>
-              <a:buClr>
-                <a:srgbClr val="F3F3F3"/>
-              </a:buClr>
-              <a:buSzPts val="5200"/>
-              <a:buFont typeface="Arial"/>
-              <a:buNone/>
-              <a:defRPr sz="5200" b="0" i="0" u="none" strike="noStrike" cap="none">
-                <a:solidFill>
-                  <a:srgbClr val="F3F3F3"/>
-                </a:solidFill>
-                <a:latin typeface="Arial"/>
-                <a:ea typeface="Arial"/>
-                <a:cs typeface="Arial"/>
-                <a:sym typeface="Arial"/>
-              </a:defRPr>
-            </a:lvl5pPr>
-            <a:lvl6pPr marR="0" lvl="5" algn="ctr" rtl="0">
-              <a:lnSpc>
-                <a:spcPct val="100000"/>
-              </a:lnSpc>
-              <a:spcBef>
-                <a:spcPts val="0"/>
-              </a:spcBef>
-              <a:spcAft>
-                <a:spcPts val="0"/>
-              </a:spcAft>
-              <a:buClr>
-                <a:srgbClr val="F3F3F3"/>
-              </a:buClr>
-              <a:buSzPts val="5200"/>
-              <a:buFont typeface="Arial"/>
-              <a:buNone/>
-              <a:defRPr sz="5200" b="0" i="0" u="none" strike="noStrike" cap="none">
-                <a:solidFill>
-                  <a:srgbClr val="F3F3F3"/>
-                </a:solidFill>
-                <a:latin typeface="Arial"/>
-                <a:ea typeface="Arial"/>
-                <a:cs typeface="Arial"/>
-                <a:sym typeface="Arial"/>
-              </a:defRPr>
-            </a:lvl6pPr>
-            <a:lvl7pPr marR="0" lvl="6" algn="ctr" rtl="0">
-              <a:lnSpc>
-                <a:spcPct val="100000"/>
-              </a:lnSpc>
-              <a:spcBef>
-                <a:spcPts val="0"/>
-              </a:spcBef>
-              <a:spcAft>
-                <a:spcPts val="0"/>
-              </a:spcAft>
-              <a:buClr>
-                <a:srgbClr val="F3F3F3"/>
-              </a:buClr>
-              <a:buSzPts val="5200"/>
-              <a:buFont typeface="Arial"/>
-              <a:buNone/>
-              <a:defRPr sz="5200" b="0" i="0" u="none" strike="noStrike" cap="none">
-                <a:solidFill>
-                  <a:srgbClr val="F3F3F3"/>
-                </a:solidFill>
-                <a:latin typeface="Arial"/>
-                <a:ea typeface="Arial"/>
-                <a:cs typeface="Arial"/>
-                <a:sym typeface="Arial"/>
-              </a:defRPr>
-            </a:lvl7pPr>
-            <a:lvl8pPr marR="0" lvl="7" algn="ctr" rtl="0">
-              <a:lnSpc>
-                <a:spcPct val="100000"/>
-              </a:lnSpc>
-              <a:spcBef>
-                <a:spcPts val="0"/>
-              </a:spcBef>
-              <a:spcAft>
-                <a:spcPts val="0"/>
-              </a:spcAft>
-              <a:buClr>
-                <a:srgbClr val="F3F3F3"/>
-              </a:buClr>
-              <a:buSzPts val="5200"/>
-              <a:buFont typeface="Arial"/>
-              <a:buNone/>
-              <a:defRPr sz="5200" b="0" i="0" u="none" strike="noStrike" cap="none">
-                <a:solidFill>
-                  <a:srgbClr val="F3F3F3"/>
-                </a:solidFill>
-                <a:latin typeface="Arial"/>
-                <a:ea typeface="Arial"/>
-                <a:cs typeface="Arial"/>
-                <a:sym typeface="Arial"/>
-              </a:defRPr>
-            </a:lvl8pPr>
-            <a:lvl9pPr marR="0" lvl="8" algn="ctr" rtl="0">
-              <a:lnSpc>
-                <a:spcPct val="100000"/>
-              </a:lnSpc>
-              <a:spcBef>
-                <a:spcPts val="0"/>
-              </a:spcBef>
-              <a:spcAft>
-                <a:spcPts val="0"/>
-              </a:spcAft>
-              <a:buClr>
-                <a:srgbClr val="F3F3F3"/>
-              </a:buClr>
-              <a:buSzPts val="5200"/>
-              <a:buFont typeface="Arial"/>
-              <a:buNone/>
-              <a:defRPr sz="5200" b="0" i="0" u="none" strike="noStrike" cap="none">
-                <a:solidFill>
-                  <a:srgbClr val="F3F3F3"/>
-                </a:solidFill>
-                <a:latin typeface="Arial"/>
-                <a:ea typeface="Arial"/>
-                <a:cs typeface="Arial"/>
-                <a:sym typeface="Arial"/>
-              </a:defRPr>
-            </a:lvl9pPr>
-          </a:lstStyle>
-          <a:p>
-            <a:r>
-              <a:rPr lang="pt-BR" sz="3200" dirty="0" smtClean="0"/>
-              <a:t>DEMONSTRAÇÃO</a:t>
-            </a:r>
-            <a:endParaRPr lang="pt-BR" sz="3200" dirty="0"/>
-          </a:p>
-        </p:txBody>
-      </p:sp>
+      </p:cxnSp>
       <p:pic>
         <p:nvPicPr>
-          <p:cNvPr id="10" name="Imagem 9">
+          <p:cNvPr id="14" name="Imagem 13">
             <a:extLst>
               <a:ext uri="{FF2B5EF4-FFF2-40B4-BE49-F238E27FC236}">
-                <a16:creationId xmlns:a16="http://schemas.microsoft.com/office/drawing/2014/main" xmlns="" id="{A1546BA2-A746-4D78-BA2A-66EACE53308E}"/>
+                <a16:creationId xmlns="" xmlns:a16="http://schemas.microsoft.com/office/drawing/2014/main" id="{A1546BA2-A746-4D78-BA2A-66EACE53308E}"/>
               </a:ext>
             </a:extLst>
           </p:cNvPr>
@@ -23204,67 +23263,8 @@
         </p:blipFill>
         <p:spPr>
           <a:xfrm>
-            <a:off x="196483" y="175701"/>
-            <a:ext cx="533852" cy="533852"/>
-          </a:xfrm>
-          <a:prstGeom prst="rect">
-            <a:avLst/>
-          </a:prstGeom>
-        </p:spPr>
-      </p:pic>
-      <p:pic>
-        <p:nvPicPr>
-          <p:cNvPr id="13" name="Imagem 12"/>
-          <p:cNvPicPr>
-            <a:picLocks noChangeAspect="1"/>
-          </p:cNvPicPr>
-          <p:nvPr/>
-        </p:nvPicPr>
-        <p:blipFill>
-          <a:blip r:embed="rId4">
-            <a:extLst>
-              <a:ext uri="{28A0092B-C50C-407E-A947-70E740481C1C}">
-                <a14:useLocalDpi xmlns:a14="http://schemas.microsoft.com/office/drawing/2010/main" val="0"/>
-              </a:ext>
-            </a:extLst>
-          </a:blip>
-          <a:stretch>
-            <a:fillRect/>
-          </a:stretch>
-        </p:blipFill>
-        <p:spPr>
-          <a:xfrm>
-            <a:off x="463409" y="1781824"/>
-            <a:ext cx="675092" cy="675092"/>
-          </a:xfrm>
-          <a:prstGeom prst="rect">
-            <a:avLst/>
-          </a:prstGeom>
-        </p:spPr>
-      </p:pic>
-      <p:pic>
-        <p:nvPicPr>
-          <p:cNvPr id="5" name="Imagem 4"/>
-          <p:cNvPicPr>
-            <a:picLocks noChangeAspect="1"/>
-          </p:cNvPicPr>
-          <p:nvPr/>
-        </p:nvPicPr>
-        <p:blipFill rotWithShape="1">
-          <a:blip r:embed="rId5">
-            <a:extLst>
-              <a:ext uri="{28A0092B-C50C-407E-A947-70E740481C1C}">
-                <a14:useLocalDpi xmlns:a14="http://schemas.microsoft.com/office/drawing/2010/main" val="0"/>
-              </a:ext>
-            </a:extLst>
-          </a:blip>
-          <a:srcRect l="27066" r="15665" b="30348"/>
-          <a:stretch/>
-        </p:blipFill>
-        <p:spPr>
-          <a:xfrm>
-            <a:off x="8001087" y="1738370"/>
-            <a:ext cx="805544" cy="762000"/>
+            <a:off x="6411514" y="1407885"/>
+            <a:ext cx="2133920" cy="2133920"/>
           </a:xfrm>
           <a:prstGeom prst="rect">
             <a:avLst/>
@@ -23274,7 +23274,7 @@
     </p:spTree>
     <p:extLst>
       <p:ext uri="{BB962C8B-B14F-4D97-AF65-F5344CB8AC3E}">
-        <p14:creationId xmlns:p14="http://schemas.microsoft.com/office/powerpoint/2010/main" val="1238809662"/>
+        <p14:creationId xmlns:p14="http://schemas.microsoft.com/office/powerpoint/2010/main" val="649081597"/>
       </p:ext>
     </p:extLst>
   </p:cSld>

</xml_diff>